<commit_message>
add double domain model report
</commit_message>
<xml_diff>
--- a/2021-6-2/ESPIRiT-SENSE.pptx
+++ b/2021-6-2/ESPIRiT-SENSE.pptx
@@ -253,7 +253,7 @@
           <a:p>
             <a:fld id="{107C1215-458B-4A9D-9D6E-69A612CF22C9}" type="datetimeFigureOut">
               <a:rPr lang="zh-CN" altLang="en-US" smtClean="0"/>
-              <a:t>2021/6/1</a:t>
+              <a:t>2022/5/12</a:t>
             </a:fld>
             <a:endParaRPr lang="zh-CN" altLang="en-US"/>
           </a:p>
@@ -431,7 +431,7 @@
             <a:fld id="{D60B4A33-8CC6-4A9D-99BB-1801B6CFF545}" type="datetimeFigureOut">
               <a:rPr lang="zh-CN" altLang="en-US" smtClean="0"/>
               <a:pPr/>
-              <a:t>2021/6/1</a:t>
+              <a:t>2022/5/12</a:t>
             </a:fld>
             <a:endParaRPr lang="zh-CN" altLang="en-US"/>
           </a:p>
@@ -2059,8 +2059,8 @@
         </p:nvSpPr>
         <p:spPr/>
       </p:sp>
-      <mc:AlternateContent xmlns:mc="http://schemas.openxmlformats.org/markup-compatibility/2006">
-        <mc:Choice xmlns:a14="http://schemas.microsoft.com/office/drawing/2010/main" Requires="a14">
+      <mc:AlternateContent xmlns:mc="http://schemas.openxmlformats.org/markup-compatibility/2006" xmlns:a14="http://schemas.microsoft.com/office/drawing/2010/main">
+        <mc:Choice Requires="a14">
           <p:sp>
             <p:nvSpPr>
               <p:cNvPr id="3" name="备注占位符 2"/>
@@ -2171,7 +2171,7 @@
                               <a:schemeClr val="tx1"/>
                             </a:solidFill>
                             <a:effectLst/>
-                            <a:latin typeface="+mn-lt"/>
+                            <a:latin typeface="Cambria Math" panose="02040503050406030204" pitchFamily="18" charset="0"/>
                             <a:ea typeface="+mn-ea"/>
                             <a:cs typeface="+mn-cs"/>
                           </a:rPr>
@@ -2184,7 +2184,7 @@
                               <a:schemeClr val="tx1"/>
                             </a:solidFill>
                             <a:effectLst/>
-                            <a:latin typeface="+mn-lt"/>
+                            <a:latin typeface="Cambria Math" panose="02040503050406030204" pitchFamily="18" charset="0"/>
                             <a:ea typeface="+mn-ea"/>
                             <a:cs typeface="+mn-cs"/>
                           </a:rPr>
@@ -2198,7 +2198,7 @@
                               <a:schemeClr val="tx1"/>
                             </a:solidFill>
                             <a:effectLst/>
-                            <a:latin typeface="+mn-lt"/>
+                            <a:latin typeface="Cambria Math" panose="02040503050406030204" pitchFamily="18" charset="0"/>
                             <a:ea typeface="+mn-ea"/>
                             <a:cs typeface="+mn-cs"/>
                           </a:rPr>
@@ -2366,7 +2366,7 @@
             </p:txBody>
           </p:sp>
         </mc:Choice>
-        <mc:Fallback>
+        <mc:Fallback xmlns="">
           <p:sp>
             <p:nvSpPr>
               <p:cNvPr id="3" name="备注占位符 2"/>
@@ -3219,7 +3219,7 @@
             <a:fld id="{C1F886BA-5FC7-4C45-9AF2-D10BC1540A8E}" type="datetimeFigureOut">
               <a:rPr lang="zh-CN" altLang="en-US" smtClean="0"/>
               <a:pPr/>
-              <a:t>2021/6/1</a:t>
+              <a:t>2022/5/12</a:t>
             </a:fld>
             <a:endParaRPr lang="zh-CN" altLang="en-US"/>
           </a:p>
@@ -3471,7 +3471,7 @@
             <a:fld id="{C1F886BA-5FC7-4C45-9AF2-D10BC1540A8E}" type="datetimeFigureOut">
               <a:rPr lang="zh-CN" altLang="en-US" smtClean="0"/>
               <a:pPr/>
-              <a:t>2021/6/1</a:t>
+              <a:t>2022/5/12</a:t>
             </a:fld>
             <a:endParaRPr lang="zh-CN" altLang="en-US"/>
           </a:p>
@@ -3639,7 +3639,7 @@
             <a:fld id="{C1F886BA-5FC7-4C45-9AF2-D10BC1540A8E}" type="datetimeFigureOut">
               <a:rPr lang="zh-CN" altLang="en-US" smtClean="0"/>
               <a:pPr/>
-              <a:t>2021/6/1</a:t>
+              <a:t>2022/5/12</a:t>
             </a:fld>
             <a:endParaRPr lang="zh-CN" altLang="en-US"/>
           </a:p>
@@ -4628,7 +4628,7 @@
             <a:fld id="{C1F886BA-5FC7-4C45-9AF2-D10BC1540A8E}" type="datetimeFigureOut">
               <a:rPr lang="zh-CN" altLang="en-US" smtClean="0"/>
               <a:pPr/>
-              <a:t>2021/6/1</a:t>
+              <a:t>2022/5/12</a:t>
             </a:fld>
             <a:endParaRPr lang="zh-CN" altLang="en-US"/>
           </a:p>
@@ -4829,7 +4829,7 @@
             <a:fld id="{C1F886BA-5FC7-4C45-9AF2-D10BC1540A8E}" type="datetimeFigureOut">
               <a:rPr lang="zh-CN" altLang="en-US" smtClean="0"/>
               <a:pPr/>
-              <a:t>2021/6/1</a:t>
+              <a:t>2022/5/12</a:t>
             </a:fld>
             <a:endParaRPr lang="zh-CN" altLang="en-US"/>
           </a:p>
@@ -5074,7 +5074,7 @@
             <a:fld id="{C1F886BA-5FC7-4C45-9AF2-D10BC1540A8E}" type="datetimeFigureOut">
               <a:rPr lang="zh-CN" altLang="en-US" smtClean="0"/>
               <a:pPr/>
-              <a:t>2021/6/1</a:t>
+              <a:t>2022/5/12</a:t>
             </a:fld>
             <a:endParaRPr lang="zh-CN" altLang="en-US"/>
           </a:p>
@@ -5359,7 +5359,7 @@
             <a:fld id="{C1F886BA-5FC7-4C45-9AF2-D10BC1540A8E}" type="datetimeFigureOut">
               <a:rPr lang="zh-CN" altLang="en-US" smtClean="0"/>
               <a:pPr/>
-              <a:t>2021/6/1</a:t>
+              <a:t>2022/5/12</a:t>
             </a:fld>
             <a:endParaRPr lang="zh-CN" altLang="en-US"/>
           </a:p>
@@ -5783,7 +5783,7 @@
             <a:fld id="{C1F886BA-5FC7-4C45-9AF2-D10BC1540A8E}" type="datetimeFigureOut">
               <a:rPr lang="zh-CN" altLang="en-US" smtClean="0"/>
               <a:pPr/>
-              <a:t>2021/6/1</a:t>
+              <a:t>2022/5/12</a:t>
             </a:fld>
             <a:endParaRPr lang="zh-CN" altLang="en-US"/>
           </a:p>
@@ -5900,7 +5900,7 @@
             <a:fld id="{C1F886BA-5FC7-4C45-9AF2-D10BC1540A8E}" type="datetimeFigureOut">
               <a:rPr lang="zh-CN" altLang="en-US" smtClean="0"/>
               <a:pPr/>
-              <a:t>2021/6/1</a:t>
+              <a:t>2022/5/12</a:t>
             </a:fld>
             <a:endParaRPr lang="zh-CN" altLang="en-US"/>
           </a:p>
@@ -5995,7 +5995,7 @@
             <a:fld id="{C1F886BA-5FC7-4C45-9AF2-D10BC1540A8E}" type="datetimeFigureOut">
               <a:rPr lang="zh-CN" altLang="en-US" smtClean="0"/>
               <a:pPr/>
-              <a:t>2021/6/1</a:t>
+              <a:t>2022/5/12</a:t>
             </a:fld>
             <a:endParaRPr lang="zh-CN" altLang="en-US"/>
           </a:p>
@@ -6178,7 +6178,7 @@
             <a:fld id="{C1F886BA-5FC7-4C45-9AF2-D10BC1540A8E}" type="datetimeFigureOut">
               <a:rPr lang="zh-CN" altLang="en-US" smtClean="0"/>
               <a:pPr/>
-              <a:t>2021/6/1</a:t>
+              <a:t>2022/5/12</a:t>
             </a:fld>
             <a:endParaRPr lang="zh-CN" altLang="en-US"/>
           </a:p>
@@ -6470,7 +6470,7 @@
             <a:fld id="{C1F886BA-5FC7-4C45-9AF2-D10BC1540A8E}" type="datetimeFigureOut">
               <a:rPr lang="zh-CN" altLang="en-US" smtClean="0"/>
               <a:pPr/>
-              <a:t>2021/6/1</a:t>
+              <a:t>2022/5/12</a:t>
             </a:fld>
             <a:endParaRPr lang="zh-CN" altLang="en-US"/>
           </a:p>
@@ -6681,7 +6681,7 @@
             <a:fld id="{C1F886BA-5FC7-4C45-9AF2-D10BC1540A8E}" type="datetimeFigureOut">
               <a:rPr lang="zh-CN" altLang="en-US" smtClean="0"/>
               <a:pPr/>
-              <a:t>2021/6/1</a:t>
+              <a:t>2022/5/12</a:t>
             </a:fld>
             <a:endParaRPr lang="zh-CN" altLang="en-US"/>
           </a:p>
@@ -9096,8 +9096,8 @@
           </a:p>
         </p:txBody>
       </p:sp>
-      <mc:AlternateContent xmlns:mc="http://schemas.openxmlformats.org/markup-compatibility/2006">
-        <mc:Choice xmlns:a14="http://schemas.microsoft.com/office/drawing/2010/main" Requires="a14">
+      <mc:AlternateContent xmlns:mc="http://schemas.openxmlformats.org/markup-compatibility/2006" xmlns:a14="http://schemas.microsoft.com/office/drawing/2010/main">
+        <mc:Choice Requires="a14">
           <p:sp>
             <p:nvSpPr>
               <p:cNvPr id="3" name="文本框 2">
@@ -9490,7 +9490,9 @@
                         <m:begChr m:val="["/>
                         <m:endChr m:val="]"/>
                         <m:ctrlPr>
-                          <a:rPr lang="zh-CN" altLang="zh-CN" i="1"/>
+                          <a:rPr lang="zh-CN" altLang="zh-CN" i="1">
+                            <a:latin typeface="Cambria Math" panose="02040503050406030204" pitchFamily="18" charset="0"/>
+                          </a:rPr>
                         </m:ctrlPr>
                       </m:dPr>
                       <m:e>
@@ -9505,7 +9507,9 @@
                               </m:mc>
                             </m:mcs>
                             <m:ctrlPr>
-                              <a:rPr lang="zh-CN" altLang="zh-CN" i="1"/>
+                              <a:rPr lang="zh-CN" altLang="zh-CN" i="1">
+                                <a:latin typeface="Cambria Math" panose="02040503050406030204" pitchFamily="18" charset="0"/>
+                              </a:rPr>
                             </m:ctrlPr>
                           </m:mPr>
                           <m:mr>
@@ -9513,7 +9517,9 @@
                               <m:sSubSup>
                                 <m:sSubSupPr>
                                   <m:ctrlPr>
-                                    <a:rPr lang="zh-CN" altLang="zh-CN" i="1"/>
+                                    <a:rPr lang="zh-CN" altLang="zh-CN" i="1">
+                                      <a:latin typeface="Cambria Math" panose="02040503050406030204" pitchFamily="18" charset="0"/>
+                                    </a:rPr>
                                   </m:ctrlPr>
                                 </m:sSubSupPr>
                                 <m:e>
@@ -9526,13 +9532,17 @@
                                 </m:e>
                                 <m:sub>
                                   <m:r>
-                                    <a:rPr lang="en-US" altLang="zh-CN" i="1"/>
+                                    <a:rPr lang="en-US" altLang="zh-CN" i="1">
+                                      <a:latin typeface="Cambria Math" panose="02040503050406030204" pitchFamily="18" charset="0"/>
+                                    </a:rPr>
                                     <m:t>1</m:t>
                                   </m:r>
                                 </m:sub>
                                 <m:sup>
                                   <m:r>
-                                    <a:rPr lang="en-US" altLang="zh-CN" i="1"/>
+                                    <a:rPr lang="en-US" altLang="zh-CN" i="1">
+                                      <a:latin typeface="Cambria Math" panose="02040503050406030204" pitchFamily="18" charset="0"/>
+                                    </a:rPr>
                                     <m:t>𝐴𝐶𝑆</m:t>
                                   </m:r>
                                 </m:sup>
@@ -9542,7 +9552,9 @@
                           <m:mr>
                             <m:e>
                               <m:r>
-                                <a:rPr lang="en-US" altLang="zh-CN" i="1"/>
+                                <a:rPr lang="en-US" altLang="zh-CN" i="1">
+                                  <a:latin typeface="Cambria Math" panose="02040503050406030204" pitchFamily="18" charset="0"/>
+                                </a:rPr>
                                 <m:t>⋮</m:t>
                               </m:r>
                             </m:e>
@@ -9552,7 +9564,9 @@
                               <m:sSubSup>
                                 <m:sSubSupPr>
                                   <m:ctrlPr>
-                                    <a:rPr lang="zh-CN" altLang="zh-CN" i="1"/>
+                                    <a:rPr lang="zh-CN" altLang="zh-CN" i="1">
+                                      <a:latin typeface="Cambria Math" panose="02040503050406030204" pitchFamily="18" charset="0"/>
+                                    </a:rPr>
                                   </m:ctrlPr>
                                 </m:sSubSupPr>
                                 <m:e>
@@ -9573,7 +9587,9 @@
                                 </m:sub>
                                 <m:sup>
                                   <m:r>
-                                    <a:rPr lang="en-US" altLang="zh-CN" i="1"/>
+                                    <a:rPr lang="en-US" altLang="zh-CN" i="1">
+                                      <a:latin typeface="Cambria Math" panose="02040503050406030204" pitchFamily="18" charset="0"/>
+                                    </a:rPr>
                                     <m:t>𝐴𝐶𝑆</m:t>
                                   </m:r>
                                 </m:sup>
@@ -9584,15 +9600,21 @@
                       </m:e>
                     </m:d>
                     <m:r>
-                      <a:rPr lang="en-US" altLang="zh-CN" i="1"/>
+                      <a:rPr lang="en-US" altLang="zh-CN" i="1">
+                        <a:latin typeface="Cambria Math" panose="02040503050406030204" pitchFamily="18" charset="0"/>
+                      </a:rPr>
                       <m:t>,</m:t>
                     </m:r>
                     <m:r>
-                      <a:rPr lang="en-US" altLang="zh-CN" i="1"/>
+                      <a:rPr lang="en-US" altLang="zh-CN" i="1">
+                        <a:latin typeface="Cambria Math" panose="02040503050406030204" pitchFamily="18" charset="0"/>
+                      </a:rPr>
                       <m:t>𝑠</m:t>
                     </m:r>
                     <m:r>
-                      <a:rPr lang="en-US" altLang="zh-CN" i="1"/>
+                      <a:rPr lang="en-US" altLang="zh-CN" i="1">
+                        <a:latin typeface="Cambria Math" panose="02040503050406030204" pitchFamily="18" charset="0"/>
+                      </a:rPr>
                       <m:t>≔</m:t>
                     </m:r>
                     <m:d>
@@ -9600,7 +9622,9 @@
                         <m:begChr m:val="["/>
                         <m:endChr m:val="]"/>
                         <m:ctrlPr>
-                          <a:rPr lang="zh-CN" altLang="zh-CN" i="1"/>
+                          <a:rPr lang="zh-CN" altLang="zh-CN" i="1">
+                            <a:latin typeface="Cambria Math" panose="02040503050406030204" pitchFamily="18" charset="0"/>
+                          </a:rPr>
                         </m:ctrlPr>
                       </m:dPr>
                       <m:e>
@@ -9615,7 +9639,9 @@
                               </m:mc>
                             </m:mcs>
                             <m:ctrlPr>
-                              <a:rPr lang="zh-CN" altLang="zh-CN" i="1"/>
+                              <a:rPr lang="zh-CN" altLang="zh-CN" i="1">
+                                <a:latin typeface="Cambria Math" panose="02040503050406030204" pitchFamily="18" charset="0"/>
+                              </a:rPr>
                             </m:ctrlPr>
                           </m:mPr>
                           <m:mr>
@@ -9623,18 +9649,24 @@
                               <m:sSub>
                                 <m:sSubPr>
                                   <m:ctrlPr>
-                                    <a:rPr lang="zh-CN" altLang="zh-CN" i="1"/>
+                                    <a:rPr lang="zh-CN" altLang="zh-CN" i="1">
+                                      <a:latin typeface="Cambria Math" panose="02040503050406030204" pitchFamily="18" charset="0"/>
+                                    </a:rPr>
                                   </m:ctrlPr>
                                 </m:sSubPr>
                                 <m:e>
                                   <m:r>
-                                    <a:rPr lang="en-US" altLang="zh-CN" i="1"/>
+                                    <a:rPr lang="en-US" altLang="zh-CN" i="1">
+                                      <a:latin typeface="Cambria Math" panose="02040503050406030204" pitchFamily="18" charset="0"/>
+                                    </a:rPr>
                                     <m:t>𝑠</m:t>
                                   </m:r>
                                 </m:e>
                                 <m:sub>
                                   <m:r>
-                                    <a:rPr lang="en-US" altLang="zh-CN" i="1"/>
+                                    <a:rPr lang="en-US" altLang="zh-CN" i="1">
+                                      <a:latin typeface="Cambria Math" panose="02040503050406030204" pitchFamily="18" charset="0"/>
+                                    </a:rPr>
                                     <m:t>1</m:t>
                                   </m:r>
                                 </m:sub>
@@ -9644,7 +9676,9 @@
                           <m:mr>
                             <m:e>
                               <m:r>
-                                <a:rPr lang="en-US" altLang="zh-CN" i="1"/>
+                                <a:rPr lang="en-US" altLang="zh-CN" i="1">
+                                  <a:latin typeface="Cambria Math" panose="02040503050406030204" pitchFamily="18" charset="0"/>
+                                </a:rPr>
                                 <m:t>⋮</m:t>
                               </m:r>
                             </m:e>
@@ -9654,12 +9688,16 @@
                               <m:sSub>
                                 <m:sSubPr>
                                   <m:ctrlPr>
-                                    <a:rPr lang="zh-CN" altLang="zh-CN" i="1"/>
+                                    <a:rPr lang="zh-CN" altLang="zh-CN" i="1">
+                                      <a:latin typeface="Cambria Math" panose="02040503050406030204" pitchFamily="18" charset="0"/>
+                                    </a:rPr>
                                   </m:ctrlPr>
                                 </m:sSubPr>
                                 <m:e>
                                   <m:r>
-                                    <a:rPr lang="en-US" altLang="zh-CN" i="1"/>
+                                    <a:rPr lang="en-US" altLang="zh-CN" i="1">
+                                      <a:latin typeface="Cambria Math" panose="02040503050406030204" pitchFamily="18" charset="0"/>
+                                    </a:rPr>
                                     <m:t>𝑠</m:t>
                                   </m:r>
                                 </m:e>
@@ -9678,30 +9716,40 @@
                       </m:e>
                     </m:d>
                     <m:r>
-                      <a:rPr lang="en-US" altLang="zh-CN" i="1"/>
+                      <a:rPr lang="en-US" altLang="zh-CN" i="1">
+                        <a:latin typeface="Cambria Math" panose="02040503050406030204" pitchFamily="18" charset="0"/>
+                      </a:rPr>
                       <m:t>, </m:t>
                     </m:r>
                     <m:sSub>
                       <m:sSubPr>
                         <m:ctrlPr>
-                          <a:rPr lang="zh-CN" altLang="zh-CN" i="1"/>
+                          <a:rPr lang="zh-CN" altLang="zh-CN" i="1">
+                            <a:latin typeface="Cambria Math" panose="02040503050406030204" pitchFamily="18" charset="0"/>
+                          </a:rPr>
                         </m:ctrlPr>
                       </m:sSubPr>
                       <m:e>
                         <m:r>
-                          <a:rPr lang="en-US" altLang="zh-CN" i="1"/>
+                          <a:rPr lang="en-US" altLang="zh-CN" i="1">
+                            <a:latin typeface="Cambria Math" panose="02040503050406030204" pitchFamily="18" charset="0"/>
+                          </a:rPr>
                           <m:t>𝑄</m:t>
                         </m:r>
                       </m:e>
                       <m:sub>
                         <m:r>
-                          <a:rPr lang="en-US" altLang="zh-CN" i="1"/>
+                          <a:rPr lang="en-US" altLang="zh-CN" i="1">
+                            <a:latin typeface="Cambria Math" panose="02040503050406030204" pitchFamily="18" charset="0"/>
+                          </a:rPr>
                           <m:t>𝑐</m:t>
                         </m:r>
                       </m:sub>
                     </m:sSub>
                     <m:r>
-                      <a:rPr lang="en-US" altLang="zh-CN" i="1"/>
+                      <a:rPr lang="en-US" altLang="zh-CN" i="1">
+                        <a:latin typeface="Cambria Math" panose="02040503050406030204" pitchFamily="18" charset="0"/>
+                      </a:rPr>
                       <m:t>≔</m:t>
                     </m:r>
                     <m:d>
@@ -9709,7 +9757,9 @@
                         <m:begChr m:val="["/>
                         <m:endChr m:val="]"/>
                         <m:ctrlPr>
-                          <a:rPr lang="zh-CN" altLang="zh-CN" i="1"/>
+                          <a:rPr lang="zh-CN" altLang="zh-CN" i="1">
+                            <a:latin typeface="Cambria Math" panose="02040503050406030204" pitchFamily="18" charset="0"/>
+                          </a:rPr>
                         </m:ctrlPr>
                       </m:dPr>
                       <m:e>
@@ -9724,7 +9774,9 @@
                               </m:mc>
                             </m:mcs>
                             <m:ctrlPr>
-                              <a:rPr lang="zh-CN" altLang="zh-CN" i="1"/>
+                              <a:rPr lang="zh-CN" altLang="zh-CN" i="1">
+                                <a:latin typeface="Cambria Math" panose="02040503050406030204" pitchFamily="18" charset="0"/>
+                              </a:rPr>
                             </m:ctrlPr>
                           </m:mPr>
                           <m:mr>
@@ -9732,18 +9784,24 @@
                               <m:sSub>
                                 <m:sSubPr>
                                   <m:ctrlPr>
-                                    <a:rPr lang="zh-CN" altLang="zh-CN" i="1"/>
+                                    <a:rPr lang="zh-CN" altLang="zh-CN" i="1">
+                                      <a:latin typeface="Cambria Math" panose="02040503050406030204" pitchFamily="18" charset="0"/>
+                                    </a:rPr>
                                   </m:ctrlPr>
                                 </m:sSubPr>
                                 <m:e>
                                   <m:r>
-                                    <a:rPr lang="en-US" altLang="zh-CN" i="1"/>
+                                    <a:rPr lang="en-US" altLang="zh-CN" i="1">
+                                      <a:latin typeface="Cambria Math" panose="02040503050406030204" pitchFamily="18" charset="0"/>
+                                    </a:rPr>
                                     <m:t>𝑃</m:t>
                                   </m:r>
                                 </m:e>
                                 <m:sub>
                                   <m:r>
-                                    <a:rPr lang="en-US" altLang="zh-CN" i="1"/>
+                                    <a:rPr lang="en-US" altLang="zh-CN" i="1">
+                                      <a:latin typeface="Cambria Math" panose="02040503050406030204" pitchFamily="18" charset="0"/>
+                                    </a:rPr>
                                     <m:t>𝑐</m:t>
                                   </m:r>
                                 </m:sub>
@@ -9756,7 +9814,9 @@
                             <m:e/>
                             <m:e>
                               <m:r>
-                                <a:rPr lang="en-US" altLang="zh-CN" i="1"/>
+                                <a:rPr lang="en-US" altLang="zh-CN" i="1">
+                                  <a:latin typeface="Cambria Math" panose="02040503050406030204" pitchFamily="18" charset="0"/>
+                                </a:rPr>
                                 <m:t>⋱</m:t>
                               </m:r>
                             </m:e>
@@ -9769,18 +9829,24 @@
                               <m:sSub>
                                 <m:sSubPr>
                                   <m:ctrlPr>
-                                    <a:rPr lang="zh-CN" altLang="zh-CN" i="1"/>
+                                    <a:rPr lang="zh-CN" altLang="zh-CN" i="1">
+                                      <a:latin typeface="Cambria Math" panose="02040503050406030204" pitchFamily="18" charset="0"/>
+                                    </a:rPr>
                                   </m:ctrlPr>
                                 </m:sSubPr>
                                 <m:e>
                                   <m:r>
-                                    <a:rPr lang="en-US" altLang="zh-CN" i="1"/>
+                                    <a:rPr lang="en-US" altLang="zh-CN" i="1">
+                                      <a:latin typeface="Cambria Math" panose="02040503050406030204" pitchFamily="18" charset="0"/>
+                                    </a:rPr>
                                     <m:t>𝑃</m:t>
                                   </m:r>
                                 </m:e>
                                 <m:sub>
                                   <m:r>
-                                    <a:rPr lang="en-US" altLang="zh-CN" i="1"/>
+                                    <a:rPr lang="en-US" altLang="zh-CN" i="1">
+                                      <a:latin typeface="Cambria Math" panose="02040503050406030204" pitchFamily="18" charset="0"/>
+                                    </a:rPr>
                                     <m:t>𝑐</m:t>
                                   </m:r>
                                 </m:sub>
@@ -9791,30 +9857,40 @@
                       </m:e>
                     </m:d>
                     <m:r>
-                      <a:rPr lang="en-US" altLang="zh-CN" i="1"/>
+                      <a:rPr lang="en-US" altLang="zh-CN" i="1">
+                        <a:latin typeface="Cambria Math" panose="02040503050406030204" pitchFamily="18" charset="0"/>
+                      </a:rPr>
                       <m:t>,</m:t>
                     </m:r>
                     <m:sSub>
                       <m:sSubPr>
                         <m:ctrlPr>
-                          <a:rPr lang="zh-CN" altLang="zh-CN" i="1"/>
+                          <a:rPr lang="zh-CN" altLang="zh-CN" i="1">
+                            <a:latin typeface="Cambria Math" panose="02040503050406030204" pitchFamily="18" charset="0"/>
+                          </a:rPr>
                         </m:ctrlPr>
                       </m:sSubPr>
                       <m:e>
                         <m:r>
-                          <a:rPr lang="en-US" altLang="zh-CN" i="1"/>
+                          <a:rPr lang="en-US" altLang="zh-CN" i="1">
+                            <a:latin typeface="Cambria Math" panose="02040503050406030204" pitchFamily="18" charset="0"/>
+                          </a:rPr>
                           <m:t>𝑈</m:t>
                         </m:r>
                       </m:e>
                       <m:sub>
                         <m:r>
-                          <a:rPr lang="en-US" altLang="zh-CN" i="1"/>
+                          <a:rPr lang="en-US" altLang="zh-CN" i="1">
+                            <a:latin typeface="Cambria Math" panose="02040503050406030204" pitchFamily="18" charset="0"/>
+                          </a:rPr>
                           <m:t>𝑝</m:t>
                         </m:r>
                       </m:sub>
                     </m:sSub>
                     <m:r>
-                      <a:rPr lang="en-US" altLang="zh-CN" i="1"/>
+                      <a:rPr lang="en-US" altLang="zh-CN" i="1">
+                        <a:latin typeface="Cambria Math" panose="02040503050406030204" pitchFamily="18" charset="0"/>
+                      </a:rPr>
                       <m:t>≔</m:t>
                     </m:r>
                     <m:d>
@@ -9822,7 +9898,9 @@
                         <m:begChr m:val="["/>
                         <m:endChr m:val="]"/>
                         <m:ctrlPr>
-                          <a:rPr lang="zh-CN" altLang="zh-CN" i="1"/>
+                          <a:rPr lang="zh-CN" altLang="zh-CN" i="1">
+                            <a:latin typeface="Cambria Math" panose="02040503050406030204" pitchFamily="18" charset="0"/>
+                          </a:rPr>
                         </m:ctrlPr>
                       </m:dPr>
                       <m:e>
@@ -9837,13 +9915,17 @@
                               </m:mc>
                             </m:mcs>
                             <m:ctrlPr>
-                              <a:rPr lang="zh-CN" altLang="zh-CN" i="1"/>
+                              <a:rPr lang="zh-CN" altLang="zh-CN" i="1">
+                                <a:latin typeface="Cambria Math" panose="02040503050406030204" pitchFamily="18" charset="0"/>
+                              </a:rPr>
                             </m:ctrlPr>
                           </m:mPr>
                           <m:mr>
                             <m:e>
                               <m:r>
-                                <a:rPr lang="en-US" altLang="zh-CN" i="1"/>
+                                <a:rPr lang="en-US" altLang="zh-CN" i="1">
+                                  <a:latin typeface="Cambria Math" panose="02040503050406030204" pitchFamily="18" charset="0"/>
+                                </a:rPr>
                                 <m:t>𝑈</m:t>
                               </m:r>
                             </m:e>
@@ -9854,7 +9936,9 @@
                             <m:e/>
                             <m:e>
                               <m:r>
-                                <a:rPr lang="en-US" altLang="zh-CN" i="1"/>
+                                <a:rPr lang="en-US" altLang="zh-CN" i="1">
+                                  <a:latin typeface="Cambria Math" panose="02040503050406030204" pitchFamily="18" charset="0"/>
+                                </a:rPr>
                                 <m:t>⋱</m:t>
                               </m:r>
                             </m:e>
@@ -9865,7 +9949,9 @@
                             <m:e/>
                             <m:e>
                               <m:r>
-                                <a:rPr lang="en-US" altLang="zh-CN" i="1"/>
+                                <a:rPr lang="en-US" altLang="zh-CN" i="1">
+                                  <a:latin typeface="Cambria Math" panose="02040503050406030204" pitchFamily="18" charset="0"/>
+                                </a:rPr>
                                 <m:t>𝑈</m:t>
                               </m:r>
                             </m:e>
@@ -9874,7 +9960,9 @@
                       </m:e>
                     </m:d>
                     <m:r>
-                      <a:rPr lang="en-US" altLang="zh-CN" i="1"/>
+                      <a:rPr lang="en-US" altLang="zh-CN" i="1">
+                        <a:latin typeface="Cambria Math" panose="02040503050406030204" pitchFamily="18" charset="0"/>
+                      </a:rPr>
                       <m:t>.</m:t>
                     </m:r>
                   </m:oMath>
@@ -9921,18 +10009,24 @@
                       <m:accPr>
                         <m:chr m:val="̂"/>
                         <m:ctrlPr>
-                          <a:rPr lang="zh-CN" altLang="zh-CN" sz="1600" i="1"/>
+                          <a:rPr lang="zh-CN" altLang="zh-CN" sz="1600" i="1">
+                            <a:latin typeface="Cambria Math" panose="02040503050406030204" pitchFamily="18" charset="0"/>
+                          </a:rPr>
                         </m:ctrlPr>
                       </m:accPr>
                       <m:e>
                         <m:r>
-                          <a:rPr lang="en-US" altLang="zh-CN" sz="1600" i="1"/>
+                          <a:rPr lang="en-US" altLang="zh-CN" sz="1600" i="1">
+                            <a:latin typeface="Cambria Math" panose="02040503050406030204" pitchFamily="18" charset="0"/>
+                          </a:rPr>
                           <m:t>𝑠</m:t>
                         </m:r>
                       </m:e>
                     </m:acc>
                     <m:r>
-                      <a:rPr lang="en-US" altLang="zh-CN" sz="1600" i="1"/>
+                      <a:rPr lang="en-US" altLang="zh-CN" sz="1600" i="1">
+                        <a:latin typeface="Cambria Math" panose="02040503050406030204" pitchFamily="18" charset="0"/>
+                      </a:rPr>
                       <m:t>=</m:t>
                     </m:r>
                     <m:r>
@@ -9945,14 +10039,18 @@
                     <m:func>
                       <m:funcPr>
                         <m:ctrlPr>
-                          <a:rPr lang="zh-CN" altLang="zh-CN" sz="1600" i="1"/>
+                          <a:rPr lang="zh-CN" altLang="zh-CN" sz="1600" i="1">
+                            <a:latin typeface="Cambria Math" panose="02040503050406030204" pitchFamily="18" charset="0"/>
+                          </a:rPr>
                         </m:ctrlPr>
                       </m:funcPr>
                       <m:fName>
                         <m:limLow>
                           <m:limLowPr>
                             <m:ctrlPr>
-                              <a:rPr lang="zh-CN" altLang="zh-CN" sz="1600" i="1"/>
+                              <a:rPr lang="zh-CN" altLang="zh-CN" sz="1600" i="1">
+                                <a:latin typeface="Cambria Math" panose="02040503050406030204" pitchFamily="18" charset="0"/>
+                              </a:rPr>
                             </m:ctrlPr>
                           </m:limLowPr>
                           <m:e>
@@ -9966,7 +10064,9 @@
                           </m:e>
                           <m:lim>
                             <m:r>
-                              <a:rPr lang="en-US" altLang="zh-CN" sz="1600" i="1"/>
+                              <a:rPr lang="en-US" altLang="zh-CN" sz="1600" i="1">
+                                <a:latin typeface="Cambria Math" panose="02040503050406030204" pitchFamily="18" charset="0"/>
+                              </a:rPr>
                               <m:t>𝑠</m:t>
                             </m:r>
                           </m:lim>
@@ -9978,25 +10078,33 @@
                             <m:begChr m:val="{"/>
                             <m:endChr m:val="}"/>
                             <m:ctrlPr>
-                              <a:rPr lang="zh-CN" altLang="zh-CN" sz="1600" i="1"/>
+                              <a:rPr lang="zh-CN" altLang="zh-CN" sz="1600" i="1">
+                                <a:latin typeface="Cambria Math" panose="02040503050406030204" pitchFamily="18" charset="0"/>
+                              </a:rPr>
                             </m:ctrlPr>
                           </m:dPr>
                           <m:e>
                             <m:f>
                               <m:fPr>
                                 <m:ctrlPr>
-                                  <a:rPr lang="zh-CN" altLang="zh-CN" sz="1600" i="1"/>
+                                  <a:rPr lang="zh-CN" altLang="zh-CN" sz="1600" i="1">
+                                    <a:latin typeface="Cambria Math" panose="02040503050406030204" pitchFamily="18" charset="0"/>
+                                  </a:rPr>
                                 </m:ctrlPr>
                               </m:fPr>
                               <m:num>
                                 <m:r>
-                                  <a:rPr lang="en-US" altLang="zh-CN" sz="1600" i="1"/>
+                                  <a:rPr lang="en-US" altLang="zh-CN" sz="1600" i="1">
+                                    <a:latin typeface="Cambria Math" panose="02040503050406030204" pitchFamily="18" charset="0"/>
+                                  </a:rPr>
                                   <m:t>1</m:t>
                                 </m:r>
                               </m:num>
                               <m:den>
                                 <m:r>
-                                  <a:rPr lang="en-US" altLang="zh-CN" sz="1600" i="1"/>
+                                  <a:rPr lang="en-US" altLang="zh-CN" sz="1600" i="1">
+                                    <a:latin typeface="Cambria Math" panose="02040503050406030204" pitchFamily="18" charset="0"/>
+                                  </a:rPr>
                                   <m:t>2</m:t>
                                 </m:r>
                               </m:den>
@@ -10004,7 +10112,9 @@
                             <m:sSubSup>
                               <m:sSubSupPr>
                                 <m:ctrlPr>
-                                  <a:rPr lang="zh-CN" altLang="zh-CN" sz="1600" i="1"/>
+                                  <a:rPr lang="zh-CN" altLang="zh-CN" sz="1600" i="1">
+                                    <a:latin typeface="Cambria Math" panose="02040503050406030204" pitchFamily="18" charset="0"/>
+                                  </a:rPr>
                                 </m:ctrlPr>
                               </m:sSubSupPr>
                               <m:e>
@@ -10013,25 +10123,33 @@
                                     <m:begChr m:val="‖"/>
                                     <m:endChr m:val="‖"/>
                                     <m:ctrlPr>
-                                      <a:rPr lang="zh-CN" altLang="zh-CN" sz="1600" i="1"/>
+                                      <a:rPr lang="zh-CN" altLang="zh-CN" sz="1600" i="1">
+                                        <a:latin typeface="Cambria Math" panose="02040503050406030204" pitchFamily="18" charset="0"/>
+                                      </a:rPr>
                                     </m:ctrlPr>
                                   </m:dPr>
                                   <m:e>
                                     <m:sSub>
                                       <m:sSubPr>
                                         <m:ctrlPr>
-                                          <a:rPr lang="zh-CN" altLang="zh-CN" sz="1600" i="1"/>
+                                          <a:rPr lang="zh-CN" altLang="zh-CN" sz="1600" i="1">
+                                            <a:latin typeface="Cambria Math" panose="02040503050406030204" pitchFamily="18" charset="0"/>
+                                          </a:rPr>
                                         </m:ctrlPr>
                                       </m:sSubPr>
                                       <m:e>
                                         <m:r>
-                                          <a:rPr lang="en-US" altLang="zh-CN" sz="1600" i="1"/>
+                                          <a:rPr lang="en-US" altLang="zh-CN" sz="1600" i="1">
+                                            <a:latin typeface="Cambria Math" panose="02040503050406030204" pitchFamily="18" charset="0"/>
+                                          </a:rPr>
                                           <m:t>𝑄</m:t>
                                         </m:r>
                                       </m:e>
                                       <m:sub>
                                         <m:r>
-                                          <a:rPr lang="en-US" altLang="zh-CN" sz="1600" i="1"/>
+                                          <a:rPr lang="en-US" altLang="zh-CN" sz="1600" i="1">
+                                            <a:latin typeface="Cambria Math" panose="02040503050406030204" pitchFamily="18" charset="0"/>
+                                          </a:rPr>
                                           <m:t>𝑐</m:t>
                                         </m:r>
                                       </m:sub>
@@ -10039,18 +10157,24 @@
                                     <m:sSub>
                                       <m:sSubPr>
                                         <m:ctrlPr>
-                                          <a:rPr lang="zh-CN" altLang="zh-CN" sz="1600" i="1"/>
+                                          <a:rPr lang="zh-CN" altLang="zh-CN" sz="1600" i="1">
+                                            <a:latin typeface="Cambria Math" panose="02040503050406030204" pitchFamily="18" charset="0"/>
+                                          </a:rPr>
                                         </m:ctrlPr>
                                       </m:sSubPr>
                                       <m:e>
                                         <m:r>
-                                          <a:rPr lang="en-US" altLang="zh-CN" sz="1600" i="1"/>
+                                          <a:rPr lang="en-US" altLang="zh-CN" sz="1600" i="1">
+                                            <a:latin typeface="Cambria Math" panose="02040503050406030204" pitchFamily="18" charset="0"/>
+                                          </a:rPr>
                                           <m:t>𝐹</m:t>
                                         </m:r>
                                       </m:e>
                                       <m:sub>
                                         <m:r>
-                                          <a:rPr lang="en-US" altLang="zh-CN" sz="1600" i="1"/>
+                                          <a:rPr lang="en-US" altLang="zh-CN" sz="1600" i="1">
+                                            <a:latin typeface="Cambria Math" panose="02040503050406030204" pitchFamily="18" charset="0"/>
+                                          </a:rPr>
                                           <m:t>𝑝</m:t>
                                         </m:r>
                                       </m:sub>
@@ -10058,28 +10182,38 @@
                                     <m:sSub>
                                       <m:sSubPr>
                                         <m:ctrlPr>
-                                          <a:rPr lang="zh-CN" altLang="zh-CN" sz="1600" i="1"/>
+                                          <a:rPr lang="zh-CN" altLang="zh-CN" sz="1600" i="1">
+                                            <a:latin typeface="Cambria Math" panose="02040503050406030204" pitchFamily="18" charset="0"/>
+                                          </a:rPr>
                                         </m:ctrlPr>
                                       </m:sSubPr>
                                       <m:e>
                                         <m:r>
-                                          <a:rPr lang="en-US" altLang="zh-CN" sz="1600" i="1"/>
+                                          <a:rPr lang="en-US" altLang="zh-CN" sz="1600" i="1">
+                                            <a:latin typeface="Cambria Math" panose="02040503050406030204" pitchFamily="18" charset="0"/>
+                                          </a:rPr>
                                           <m:t>𝑈</m:t>
                                         </m:r>
                                       </m:e>
                                       <m:sub>
                                         <m:r>
-                                          <a:rPr lang="en-US" altLang="zh-CN" sz="1600" i="1"/>
+                                          <a:rPr lang="en-US" altLang="zh-CN" sz="1600" i="1">
+                                            <a:latin typeface="Cambria Math" panose="02040503050406030204" pitchFamily="18" charset="0"/>
+                                          </a:rPr>
                                           <m:t>𝑝</m:t>
                                         </m:r>
                                       </m:sub>
                                     </m:sSub>
                                     <m:r>
-                                      <a:rPr lang="en-US" altLang="zh-CN" sz="1600" i="1"/>
+                                      <a:rPr lang="en-US" altLang="zh-CN" sz="1600" i="1">
+                                        <a:latin typeface="Cambria Math" panose="02040503050406030204" pitchFamily="18" charset="0"/>
+                                      </a:rPr>
                                       <m:t>𝑠</m:t>
                                     </m:r>
                                     <m:r>
-                                      <a:rPr lang="en-US" altLang="zh-CN" sz="1600" i="1"/>
+                                      <a:rPr lang="en-US" altLang="zh-CN" sz="1600" i="1">
+                                        <a:latin typeface="Cambria Math" panose="02040503050406030204" pitchFamily="18" charset="0"/>
+                                      </a:rPr>
                                       <m:t>−</m:t>
                                     </m:r>
                                     <m:sSub>
@@ -10112,36 +10246,48 @@
                               </m:e>
                               <m:sub>
                                 <m:r>
-                                  <a:rPr lang="en-US" altLang="zh-CN" sz="1600" i="1"/>
+                                  <a:rPr lang="en-US" altLang="zh-CN" sz="1600" i="1">
+                                    <a:latin typeface="Cambria Math" panose="02040503050406030204" pitchFamily="18" charset="0"/>
+                                  </a:rPr>
                                   <m:t>2</m:t>
                                 </m:r>
                               </m:sub>
                               <m:sup>
                                 <m:r>
-                                  <a:rPr lang="en-US" altLang="zh-CN" sz="1600" i="1"/>
+                                  <a:rPr lang="en-US" altLang="zh-CN" sz="1600" i="1">
+                                    <a:latin typeface="Cambria Math" panose="02040503050406030204" pitchFamily="18" charset="0"/>
+                                  </a:rPr>
                                   <m:t>2</m:t>
                                 </m:r>
                               </m:sup>
                             </m:sSubSup>
                             <m:r>
-                              <a:rPr lang="en-US" altLang="zh-CN" sz="1600" i="1"/>
+                              <a:rPr lang="en-US" altLang="zh-CN" sz="1600" i="1">
+                                <a:latin typeface="Cambria Math" panose="02040503050406030204" pitchFamily="18" charset="0"/>
+                              </a:rPr>
                               <m:t>+</m:t>
                             </m:r>
                             <m:sSub>
                               <m:sSubPr>
                                 <m:ctrlPr>
-                                  <a:rPr lang="zh-CN" altLang="zh-CN" sz="1600" i="1"/>
+                                  <a:rPr lang="zh-CN" altLang="zh-CN" sz="1600" i="1">
+                                    <a:latin typeface="Cambria Math" panose="02040503050406030204" pitchFamily="18" charset="0"/>
+                                  </a:rPr>
                                 </m:ctrlPr>
                               </m:sSubPr>
                               <m:e>
                                 <m:r>
-                                  <a:rPr lang="en-US" altLang="zh-CN" sz="1600" i="1"/>
+                                  <a:rPr lang="en-US" altLang="zh-CN" sz="1600" i="1">
+                                    <a:latin typeface="Cambria Math" panose="02040503050406030204" pitchFamily="18" charset="0"/>
+                                  </a:rPr>
                                   <m:t>𝜆</m:t>
                                 </m:r>
                               </m:e>
                               <m:sub>
                                 <m:r>
-                                  <a:rPr lang="en-US" altLang="zh-CN" sz="1600" i="1"/>
+                                  <a:rPr lang="en-US" altLang="zh-CN" sz="1600" i="1">
+                                    <a:latin typeface="Cambria Math" panose="02040503050406030204" pitchFamily="18" charset="0"/>
+                                  </a:rPr>
                                   <m:t>𝑠</m:t>
                                 </m:r>
                               </m:sub>
@@ -10149,7 +10295,9 @@
                             <m:sSubSup>
                               <m:sSubSupPr>
                                 <m:ctrlPr>
-                                  <a:rPr lang="zh-CN" altLang="zh-CN" sz="1600" i="1"/>
+                                  <a:rPr lang="zh-CN" altLang="zh-CN" sz="1600" i="1">
+                                    <a:latin typeface="Cambria Math" panose="02040503050406030204" pitchFamily="18" charset="0"/>
+                                  </a:rPr>
                                 </m:ctrlPr>
                               </m:sSubSupPr>
                               <m:e>
@@ -10158,41 +10306,55 @@
                                     <m:begChr m:val="‖"/>
                                     <m:endChr m:val="‖"/>
                                     <m:ctrlPr>
-                                      <a:rPr lang="zh-CN" altLang="zh-CN" sz="1600" i="1"/>
+                                      <a:rPr lang="zh-CN" altLang="zh-CN" sz="1600" i="1">
+                                        <a:latin typeface="Cambria Math" panose="02040503050406030204" pitchFamily="18" charset="0"/>
+                                      </a:rPr>
                                     </m:ctrlPr>
                                   </m:dPr>
                                   <m:e>
                                     <m:sSubSup>
                                       <m:sSubSupPr>
                                         <m:ctrlPr>
-                                          <a:rPr lang="zh-CN" altLang="zh-CN" sz="1600" i="1"/>
+                                          <a:rPr lang="zh-CN" altLang="zh-CN" sz="1600" i="1">
+                                            <a:latin typeface="Cambria Math" panose="02040503050406030204" pitchFamily="18" charset="0"/>
+                                          </a:rPr>
                                         </m:ctrlPr>
                                       </m:sSubSupPr>
                                       <m:e>
                                         <m:r>
-                                          <a:rPr lang="en-US" altLang="zh-CN" sz="1600" i="1"/>
+                                          <a:rPr lang="en-US" altLang="zh-CN" sz="1600" i="1">
+                                            <a:latin typeface="Cambria Math" panose="02040503050406030204" pitchFamily="18" charset="0"/>
+                                          </a:rPr>
                                           <m:t>𝑊</m:t>
                                         </m:r>
                                       </m:e>
                                       <m:sub>
                                         <m:r>
-                                          <a:rPr lang="en-US" altLang="zh-CN" sz="1600" i="1"/>
+                                          <a:rPr lang="en-US" altLang="zh-CN" sz="1600" i="1">
+                                            <a:latin typeface="Cambria Math" panose="02040503050406030204" pitchFamily="18" charset="0"/>
+                                          </a:rPr>
                                           <m:t>3</m:t>
                                         </m:r>
                                         <m:r>
-                                          <a:rPr lang="en-US" altLang="zh-CN" sz="1600" i="1"/>
+                                          <a:rPr lang="en-US" altLang="zh-CN" sz="1600" i="1">
+                                            <a:latin typeface="Cambria Math" panose="02040503050406030204" pitchFamily="18" charset="0"/>
+                                          </a:rPr>
                                           <m:t>𝐷</m:t>
                                         </m:r>
                                       </m:sub>
                                       <m:sup>
                                         <m:r>
-                                          <a:rPr lang="en-US" altLang="zh-CN" sz="1600" i="1"/>
+                                          <a:rPr lang="en-US" altLang="zh-CN" sz="1600" i="1">
+                                            <a:latin typeface="Cambria Math" panose="02040503050406030204" pitchFamily="18" charset="0"/>
+                                          </a:rPr>
                                           <m:t>h𝑖𝑔h</m:t>
                                         </m:r>
                                       </m:sup>
                                     </m:sSubSup>
                                     <m:r>
-                                      <a:rPr lang="en-US" altLang="zh-CN" sz="1600" i="1"/>
+                                      <a:rPr lang="en-US" altLang="zh-CN" sz="1600" i="1">
+                                        <a:latin typeface="Cambria Math" panose="02040503050406030204" pitchFamily="18" charset="0"/>
+                                      </a:rPr>
                                       <m:t>𝑠</m:t>
                                     </m:r>
                                   </m:e>
@@ -10200,35 +10362,49 @@
                               </m:e>
                               <m:sub>
                                 <m:r>
-                                  <a:rPr lang="en-US" altLang="zh-CN" sz="1600" i="1"/>
+                                  <a:rPr lang="en-US" altLang="zh-CN" sz="1600" i="1">
+                                    <a:latin typeface="Cambria Math" panose="02040503050406030204" pitchFamily="18" charset="0"/>
+                                  </a:rPr>
                                   <m:t>2</m:t>
                                 </m:r>
                               </m:sub>
                               <m:sup>
                                 <m:r>
-                                  <a:rPr lang="en-US" altLang="zh-CN" sz="1600" i="1"/>
+                                  <a:rPr lang="en-US" altLang="zh-CN" sz="1600" i="1">
+                                    <a:latin typeface="Cambria Math" panose="02040503050406030204" pitchFamily="18" charset="0"/>
+                                  </a:rPr>
                                   <m:t>2</m:t>
                                 </m:r>
                               </m:sup>
                             </m:sSubSup>
                             <m:r>
-                              <a:rPr lang="en-US" altLang="zh-CN" sz="1600" i="1"/>
+                              <a:rPr lang="en-US" altLang="zh-CN" sz="1600" i="1">
+                                <a:latin typeface="Cambria Math" panose="02040503050406030204" pitchFamily="18" charset="0"/>
+                              </a:rPr>
                               <m:t>,</m:t>
                             </m:r>
                             <m:r>
-                              <a:rPr lang="en-US" altLang="zh-CN" sz="1600" i="1"/>
+                              <a:rPr lang="en-US" altLang="zh-CN" sz="1600" i="1">
+                                <a:latin typeface="Cambria Math" panose="02040503050406030204" pitchFamily="18" charset="0"/>
+                              </a:rPr>
                               <m:t>𝑆</m:t>
                             </m:r>
                             <m:r>
-                              <a:rPr lang="en-US" altLang="zh-CN" sz="1600" i="1"/>
+                              <a:rPr lang="en-US" altLang="zh-CN" sz="1600" i="1">
+                                <a:latin typeface="Cambria Math" panose="02040503050406030204" pitchFamily="18" charset="0"/>
+                              </a:rPr>
                               <m:t>.</m:t>
                             </m:r>
                             <m:r>
-                              <a:rPr lang="en-US" altLang="zh-CN" sz="1600" i="1"/>
+                              <a:rPr lang="en-US" altLang="zh-CN" sz="1600" i="1">
+                                <a:latin typeface="Cambria Math" panose="02040503050406030204" pitchFamily="18" charset="0"/>
+                              </a:rPr>
                               <m:t>𝑇</m:t>
                             </m:r>
                             <m:r>
-                              <a:rPr lang="en-US" altLang="zh-CN" sz="1600" i="1"/>
+                              <a:rPr lang="en-US" altLang="zh-CN" sz="1600" i="1">
+                                <a:latin typeface="Cambria Math" panose="02040503050406030204" pitchFamily="18" charset="0"/>
+                              </a:rPr>
                               <m:t>.</m:t>
                             </m:r>
                             <m:nary>
@@ -10237,16 +10413,22 @@
                                 <m:limLoc m:val="undOvr"/>
                                 <m:supHide m:val="on"/>
                                 <m:ctrlPr>
-                                  <a:rPr lang="zh-CN" altLang="zh-CN" sz="1600" i="1"/>
+                                  <a:rPr lang="zh-CN" altLang="zh-CN" sz="1600" i="1">
+                                    <a:latin typeface="Cambria Math" panose="02040503050406030204" pitchFamily="18" charset="0"/>
+                                  </a:rPr>
                                 </m:ctrlPr>
                               </m:naryPr>
                               <m:sub>
                                 <m:r>
-                                  <a:rPr lang="en-US" altLang="zh-CN" sz="1600" i="1"/>
+                                  <a:rPr lang="en-US" altLang="zh-CN" sz="1600" i="1">
+                                    <a:latin typeface="Cambria Math" panose="02040503050406030204" pitchFamily="18" charset="0"/>
+                                  </a:rPr>
                                   <m:t>𝑙</m:t>
                                 </m:r>
                                 <m:r>
-                                  <a:rPr lang="en-US" altLang="zh-CN" sz="1600" i="1"/>
+                                  <a:rPr lang="en-US" altLang="zh-CN" sz="1600" i="1">
+                                    <a:latin typeface="Cambria Math" panose="02040503050406030204" pitchFamily="18" charset="0"/>
+                                  </a:rPr>
                                   <m:t>=1</m:t>
                                 </m:r>
                               </m:sub>
@@ -10256,25 +10438,33 @@
                                   <m:accPr>
                                     <m:chr m:val="̅"/>
                                     <m:ctrlPr>
-                                      <a:rPr lang="zh-CN" altLang="zh-CN" sz="1600" i="1"/>
+                                      <a:rPr lang="zh-CN" altLang="zh-CN" sz="1600" i="1">
+                                        <a:latin typeface="Cambria Math" panose="02040503050406030204" pitchFamily="18" charset="0"/>
+                                      </a:rPr>
                                     </m:ctrlPr>
                                   </m:accPr>
                                   <m:e>
                                     <m:sSub>
                                       <m:sSubPr>
                                         <m:ctrlPr>
-                                          <a:rPr lang="zh-CN" altLang="zh-CN" sz="1600" i="1"/>
+                                          <a:rPr lang="zh-CN" altLang="zh-CN" sz="1600" i="1">
+                                            <a:latin typeface="Cambria Math" panose="02040503050406030204" pitchFamily="18" charset="0"/>
+                                          </a:rPr>
                                         </m:ctrlPr>
                                       </m:sSubPr>
                                       <m:e>
                                         <m:r>
-                                          <a:rPr lang="en-US" altLang="zh-CN" sz="1600" i="1"/>
+                                          <a:rPr lang="en-US" altLang="zh-CN" sz="1600" i="1">
+                                            <a:latin typeface="Cambria Math" panose="02040503050406030204" pitchFamily="18" charset="0"/>
+                                          </a:rPr>
                                           <m:t>𝑠</m:t>
                                         </m:r>
                                       </m:e>
                                       <m:sub>
                                         <m:r>
-                                          <a:rPr lang="en-US" altLang="zh-CN" sz="1600" i="1"/>
+                                          <a:rPr lang="en-US" altLang="zh-CN" sz="1600" i="1">
+                                            <a:latin typeface="Cambria Math" panose="02040503050406030204" pitchFamily="18" charset="0"/>
+                                          </a:rPr>
                                           <m:t>𝑙</m:t>
                                         </m:r>
                                       </m:sub>
@@ -10284,12 +10474,16 @@
                                         <m:begChr m:val="["/>
                                         <m:endChr m:val="]"/>
                                         <m:ctrlPr>
-                                          <a:rPr lang="zh-CN" altLang="zh-CN" sz="1600" i="1"/>
+                                          <a:rPr lang="zh-CN" altLang="zh-CN" sz="1600" i="1">
+                                            <a:latin typeface="Cambria Math" panose="02040503050406030204" pitchFamily="18" charset="0"/>
+                                          </a:rPr>
                                         </m:ctrlPr>
                                       </m:dPr>
                                       <m:e>
                                         <m:r>
-                                          <a:rPr lang="en-US" altLang="zh-CN" sz="1600" i="1"/>
+                                          <a:rPr lang="en-US" altLang="zh-CN" sz="1600" i="1">
+                                            <a:latin typeface="Cambria Math" panose="02040503050406030204" pitchFamily="18" charset="0"/>
+                                          </a:rPr>
                                           <m:t>𝑟</m:t>
                                         </m:r>
                                       </m:e>
@@ -10299,18 +10493,24 @@
                                 <m:sSub>
                                   <m:sSubPr>
                                     <m:ctrlPr>
-                                      <a:rPr lang="zh-CN" altLang="zh-CN" sz="1600" i="1"/>
+                                      <a:rPr lang="zh-CN" altLang="zh-CN" sz="1600" i="1">
+                                        <a:latin typeface="Cambria Math" panose="02040503050406030204" pitchFamily="18" charset="0"/>
+                                      </a:rPr>
                                     </m:ctrlPr>
                                   </m:sSubPr>
                                   <m:e>
                                     <m:r>
-                                      <a:rPr lang="en-US" altLang="zh-CN" sz="1600" i="1"/>
+                                      <a:rPr lang="en-US" altLang="zh-CN" sz="1600" i="1">
+                                        <a:latin typeface="Cambria Math" panose="02040503050406030204" pitchFamily="18" charset="0"/>
+                                      </a:rPr>
                                       <m:t>𝑠</m:t>
                                     </m:r>
                                   </m:e>
                                   <m:sub>
                                     <m:r>
-                                      <a:rPr lang="en-US" altLang="zh-CN" sz="1600" i="1"/>
+                                      <a:rPr lang="en-US" altLang="zh-CN" sz="1600" i="1">
+                                        <a:latin typeface="Cambria Math" panose="02040503050406030204" pitchFamily="18" charset="0"/>
+                                      </a:rPr>
                                       <m:t>𝑙</m:t>
                                     </m:r>
                                   </m:sub>
@@ -10320,12 +10520,16 @@
                                     <m:begChr m:val="["/>
                                     <m:endChr m:val="]"/>
                                     <m:ctrlPr>
-                                      <a:rPr lang="zh-CN" altLang="zh-CN" sz="1600" i="1"/>
+                                      <a:rPr lang="zh-CN" altLang="zh-CN" sz="1600" i="1">
+                                        <a:latin typeface="Cambria Math" panose="02040503050406030204" pitchFamily="18" charset="0"/>
+                                      </a:rPr>
                                     </m:ctrlPr>
                                   </m:dPr>
                                   <m:e>
                                     <m:r>
-                                      <a:rPr lang="en-US" altLang="zh-CN" sz="1600" i="1"/>
+                                      <a:rPr lang="en-US" altLang="zh-CN" sz="1600" i="1">
+                                        <a:latin typeface="Cambria Math" panose="02040503050406030204" pitchFamily="18" charset="0"/>
+                                      </a:rPr>
                                       <m:t>𝑟</m:t>
                                     </m:r>
                                   </m:e>
@@ -10333,19 +10537,27 @@
                               </m:e>
                             </m:nary>
                             <m:r>
-                              <a:rPr lang="en-US" altLang="zh-CN" sz="1600" i="1"/>
+                              <a:rPr lang="en-US" altLang="zh-CN" sz="1600" i="1">
+                                <a:latin typeface="Cambria Math" panose="02040503050406030204" pitchFamily="18" charset="0"/>
+                              </a:rPr>
                               <m:t>=1 :</m:t>
                             </m:r>
                             <m:r>
-                              <a:rPr lang="en-US" altLang="zh-CN" sz="1600" i="1"/>
+                              <a:rPr lang="en-US" altLang="zh-CN" sz="1600" i="1">
+                                <a:latin typeface="Cambria Math" panose="02040503050406030204" pitchFamily="18" charset="0"/>
+                              </a:rPr>
                               <m:t>𝑟</m:t>
                             </m:r>
                             <m:r>
-                              <a:rPr lang="en-US" altLang="zh-CN" sz="1600" i="1"/>
+                              <a:rPr lang="en-US" altLang="zh-CN" sz="1600" i="1">
+                                <a:latin typeface="Cambria Math" panose="02040503050406030204" pitchFamily="18" charset="0"/>
+                              </a:rPr>
                               <m:t>=1,…,#</m:t>
                             </m:r>
                             <m:r>
-                              <a:rPr lang="en-US" altLang="zh-CN" sz="1600" i="1"/>
+                              <a:rPr lang="en-US" altLang="zh-CN" sz="1600" i="1">
+                                <a:latin typeface="Cambria Math" panose="02040503050406030204" pitchFamily="18" charset="0"/>
+                              </a:rPr>
                               <m:t>𝑢</m:t>
                             </m:r>
                           </m:e>
@@ -10372,7 +10584,7 @@
             </p:txBody>
           </p:sp>
         </mc:Choice>
-        <mc:Fallback>
+        <mc:Fallback xmlns="">
           <p:sp>
             <p:nvSpPr>
               <p:cNvPr id="3" name="文本框 2">
@@ -10567,8 +10779,8 @@
           </a:p>
         </p:txBody>
       </p:sp>
-      <mc:AlternateContent xmlns:mc="http://schemas.openxmlformats.org/markup-compatibility/2006">
-        <mc:Choice xmlns:a14="http://schemas.microsoft.com/office/drawing/2010/main" Requires="a14">
+      <mc:AlternateContent xmlns:mc="http://schemas.openxmlformats.org/markup-compatibility/2006" xmlns:a14="http://schemas.microsoft.com/office/drawing/2010/main">
+        <mc:Choice Requires="a14">
           <p:sp>
             <p:nvSpPr>
               <p:cNvPr id="4" name="文本框 3">
@@ -10764,7 +10976,9 @@
                 <a14:m>
                   <m:oMath xmlns:m="http://schemas.openxmlformats.org/officeDocument/2006/math">
                     <m:r>
-                      <a:rPr lang="en-US" altLang="zh-CN" i="1"/>
+                      <a:rPr lang="en-US" altLang="zh-CN" i="1">
+                        <a:latin typeface="Cambria Math" panose="02040503050406030204" pitchFamily="18" charset="0"/>
+                      </a:rPr>
                       <m:t>𝑘</m:t>
                     </m:r>
                   </m:oMath>
@@ -10865,7 +11079,7 @@
             </p:txBody>
           </p:sp>
         </mc:Choice>
-        <mc:Fallback>
+        <mc:Fallback xmlns="">
           <p:sp>
             <p:nvSpPr>
               <p:cNvPr id="4" name="文本框 3">
@@ -12081,11 +12295,11 @@
   <p:clrMapOvr>
     <a:masterClrMapping/>
   </p:clrMapOvr>
-  <mc:AlternateContent xmlns:mc="http://schemas.openxmlformats.org/markup-compatibility/2006">
-    <mc:Choice xmlns:p14="http://schemas.microsoft.com/office/powerpoint/2010/main" Requires="p14">
+  <mc:AlternateContent xmlns:mc="http://schemas.openxmlformats.org/markup-compatibility/2006" xmlns:p14="http://schemas.microsoft.com/office/powerpoint/2010/main">
+    <mc:Choice Requires="p14">
       <p:transition p14:dur="10"/>
     </mc:Choice>
-    <mc:Fallback>
+    <mc:Fallback xmlns="">
       <p:transition/>
     </mc:Fallback>
   </mc:AlternateContent>
@@ -12220,8 +12434,8 @@
           </a:p>
         </p:txBody>
       </p:sp>
-      <mc:AlternateContent xmlns:mc="http://schemas.openxmlformats.org/markup-compatibility/2006">
-        <mc:Choice xmlns:a14="http://schemas.microsoft.com/office/drawing/2010/main" Requires="a14">
+      <mc:AlternateContent xmlns:mc="http://schemas.openxmlformats.org/markup-compatibility/2006" xmlns:a14="http://schemas.microsoft.com/office/drawing/2010/main">
+        <mc:Choice Requires="a14">
           <p:sp>
             <p:nvSpPr>
               <p:cNvPr id="11" name="文本框 10">
@@ -12310,19 +12524,7 @@
                         <a:rPr lang="en-US" altLang="zh-CN" b="0" i="1" smtClean="0">
                           <a:latin typeface="Cambria Math" panose="02040503050406030204" pitchFamily="18" charset="0"/>
                         </a:rPr>
-                        <m:t>                   [</m:t>
-                      </m:r>
-                      <m:r>
-                        <a:rPr lang="en-US" altLang="zh-CN" b="0" i="1" smtClean="0">
-                          <a:latin typeface="Cambria Math" panose="02040503050406030204" pitchFamily="18" charset="0"/>
-                        </a:rPr>
-                        <m:t>4</m:t>
-                      </m:r>
-                      <m:r>
-                        <a:rPr lang="en-US" altLang="zh-CN" b="0" i="1" smtClean="0">
-                          <a:latin typeface="Cambria Math" panose="02040503050406030204" pitchFamily="18" charset="0"/>
-                        </a:rPr>
-                        <m:t>]</m:t>
+                        <m:t>                   [4]</m:t>
                       </m:r>
                     </m:oMath>
                   </m:oMathPara>
@@ -12332,7 +12534,7 @@
             </p:txBody>
           </p:sp>
         </mc:Choice>
-        <mc:Fallback>
+        <mc:Fallback xmlns="">
           <p:sp>
             <p:nvSpPr>
               <p:cNvPr id="11" name="文本框 10">
@@ -12822,8 +13024,8 @@
           </a:p>
         </p:txBody>
       </p:sp>
-      <mc:AlternateContent xmlns:mc="http://schemas.openxmlformats.org/markup-compatibility/2006">
-        <mc:Choice xmlns:a14="http://schemas.microsoft.com/office/drawing/2010/main" Requires="a14">
+      <mc:AlternateContent xmlns:mc="http://schemas.openxmlformats.org/markup-compatibility/2006" xmlns:a14="http://schemas.microsoft.com/office/drawing/2010/main">
+        <mc:Choice Requires="a14">
           <p:sp>
             <p:nvSpPr>
               <p:cNvPr id="3" name="文本框 2">
@@ -13148,7 +13350,7 @@
             </p:txBody>
           </p:sp>
         </mc:Choice>
-        <mc:Fallback>
+        <mc:Fallback xmlns="">
           <p:sp>
             <p:nvSpPr>
               <p:cNvPr id="3" name="文本框 2">
@@ -13193,8 +13395,8 @@
           </p:sp>
         </mc:Fallback>
       </mc:AlternateContent>
-      <mc:AlternateContent xmlns:mc="http://schemas.openxmlformats.org/markup-compatibility/2006">
-        <mc:Choice xmlns:a14="http://schemas.microsoft.com/office/drawing/2010/main" Requires="a14">
+      <mc:AlternateContent xmlns:mc="http://schemas.openxmlformats.org/markup-compatibility/2006" xmlns:a14="http://schemas.microsoft.com/office/drawing/2010/main">
+        <mc:Choice Requires="a14">
           <p:sp>
             <p:nvSpPr>
               <p:cNvPr id="6" name="文本框 5">
@@ -13463,7 +13665,7 @@
             </p:txBody>
           </p:sp>
         </mc:Choice>
-        <mc:Fallback>
+        <mc:Fallback xmlns="">
           <p:sp>
             <p:nvSpPr>
               <p:cNvPr id="6" name="文本框 5">
@@ -13508,8 +13710,8 @@
           </p:sp>
         </mc:Fallback>
       </mc:AlternateContent>
-      <mc:AlternateContent xmlns:mc="http://schemas.openxmlformats.org/markup-compatibility/2006">
-        <mc:Choice xmlns:a14="http://schemas.microsoft.com/office/drawing/2010/main" Requires="a14">
+      <mc:AlternateContent xmlns:mc="http://schemas.openxmlformats.org/markup-compatibility/2006" xmlns:a14="http://schemas.microsoft.com/office/drawing/2010/main">
+        <mc:Choice Requires="a14">
           <p:sp>
             <p:nvSpPr>
               <p:cNvPr id="7" name="文本框 6">
@@ -13673,7 +13875,7 @@
             </p:txBody>
           </p:sp>
         </mc:Choice>
-        <mc:Fallback>
+        <mc:Fallback xmlns="">
           <p:sp>
             <p:nvSpPr>
               <p:cNvPr id="7" name="文本框 6">
@@ -13763,8 +13965,8 @@
           </a:p>
         </p:txBody>
       </p:sp>
-      <mc:AlternateContent xmlns:mc="http://schemas.openxmlformats.org/markup-compatibility/2006">
-        <mc:Choice xmlns:a14="http://schemas.microsoft.com/office/drawing/2010/main" Requires="a14">
+      <mc:AlternateContent xmlns:mc="http://schemas.openxmlformats.org/markup-compatibility/2006" xmlns:a14="http://schemas.microsoft.com/office/drawing/2010/main">
+        <mc:Choice Requires="a14">
           <p:sp>
             <p:nvSpPr>
               <p:cNvPr id="9" name="矩形 8">
@@ -13971,7 +14173,7 @@
             </p:txBody>
           </p:sp>
         </mc:Choice>
-        <mc:Fallback>
+        <mc:Fallback xmlns="">
           <p:sp>
             <p:nvSpPr>
               <p:cNvPr id="9" name="矩形 8">
@@ -14112,8 +14314,8 @@
           </a:p>
         </p:txBody>
       </p:sp>
-      <mc:AlternateContent xmlns:mc="http://schemas.openxmlformats.org/markup-compatibility/2006">
-        <mc:Choice xmlns:a14="http://schemas.microsoft.com/office/drawing/2010/main" Requires="a14">
+      <mc:AlternateContent xmlns:mc="http://schemas.openxmlformats.org/markup-compatibility/2006" xmlns:a14="http://schemas.microsoft.com/office/drawing/2010/main">
+        <mc:Choice Requires="a14">
           <p:sp>
             <p:nvSpPr>
               <p:cNvPr id="3" name="文本框 2">
@@ -14870,7 +15072,7 @@
             </p:txBody>
           </p:sp>
         </mc:Choice>
-        <mc:Fallback>
+        <mc:Fallback xmlns="">
           <p:sp>
             <p:nvSpPr>
               <p:cNvPr id="3" name="文本框 2">
@@ -14953,8 +15155,8 @@
           <a:chExt cx="0" cy="0"/>
         </a:xfrm>
       </p:grpSpPr>
-      <mc:AlternateContent xmlns:mc="http://schemas.openxmlformats.org/markup-compatibility/2006">
-        <mc:Choice xmlns:a14="http://schemas.microsoft.com/office/drawing/2010/main" Requires="a14">
+      <mc:AlternateContent xmlns:mc="http://schemas.openxmlformats.org/markup-compatibility/2006" xmlns:a14="http://schemas.microsoft.com/office/drawing/2010/main">
+        <mc:Choice Requires="a14">
           <p:sp>
             <p:nvSpPr>
               <p:cNvPr id="2" name="文本框 1">
@@ -15652,7 +15854,7 @@
             </p:txBody>
           </p:sp>
         </mc:Choice>
-        <mc:Fallback>
+        <mc:Fallback xmlns="">
           <p:sp>
             <p:nvSpPr>
               <p:cNvPr id="2" name="文本框 1">
@@ -16395,7 +16597,6 @@
           <a:ln>
             <a:noFill/>
           </a:ln>
-          <a:extLst/>
         </p:spPr>
         <p:txBody>
           <a:bodyPr wrap="square" lIns="68580" tIns="34290" rIns="68580" bIns="34290">
@@ -17572,8 +17773,8 @@
           </a:p>
         </p:txBody>
       </p:sp>
-      <mc:AlternateContent xmlns:mc="http://schemas.openxmlformats.org/markup-compatibility/2006">
-        <mc:Choice xmlns:a14="http://schemas.microsoft.com/office/drawing/2010/main" Requires="a14">
+      <mc:AlternateContent xmlns:mc="http://schemas.openxmlformats.org/markup-compatibility/2006" xmlns:a14="http://schemas.microsoft.com/office/drawing/2010/main">
+        <mc:Choice Requires="a14">
           <p:sp>
             <p:nvSpPr>
               <p:cNvPr id="4" name="文本框 3">
@@ -17643,7 +17844,7 @@
             </p:txBody>
           </p:sp>
         </mc:Choice>
-        <mc:Fallback>
+        <mc:Fallback xmlns="">
           <p:sp>
             <p:nvSpPr>
               <p:cNvPr id="4" name="文本框 3">
@@ -17987,8 +18188,8 @@
           </p:sp>
         </mc:Fallback>
       </mc:AlternateContent>
-      <mc:AlternateContent xmlns:mc="http://schemas.openxmlformats.org/markup-compatibility/2006">
-        <mc:Choice xmlns:a14="http://schemas.microsoft.com/office/drawing/2010/main" Requires="a14">
+      <mc:AlternateContent xmlns:mc="http://schemas.openxmlformats.org/markup-compatibility/2006" xmlns:a14="http://schemas.microsoft.com/office/drawing/2010/main">
+        <mc:Choice Requires="a14">
           <p:sp>
             <p:nvSpPr>
               <p:cNvPr id="7" name="文本框 6">
@@ -18112,7 +18313,7 @@
             </p:txBody>
           </p:sp>
         </mc:Choice>
-        <mc:Fallback>
+        <mc:Fallback xmlns="">
           <p:sp>
             <p:nvSpPr>
               <p:cNvPr id="7" name="文本框 6">
@@ -18157,8 +18358,8 @@
           </p:sp>
         </mc:Fallback>
       </mc:AlternateContent>
-      <mc:AlternateContent xmlns:mc="http://schemas.openxmlformats.org/markup-compatibility/2006">
-        <mc:Choice xmlns:a14="http://schemas.microsoft.com/office/drawing/2010/main" Requires="a14">
+      <mc:AlternateContent xmlns:mc="http://schemas.openxmlformats.org/markup-compatibility/2006" xmlns:a14="http://schemas.microsoft.com/office/drawing/2010/main">
+        <mc:Choice Requires="a14">
           <p:sp>
             <p:nvSpPr>
               <p:cNvPr id="8" name="文本框 7">
@@ -18351,7 +18552,7 @@
             </p:txBody>
           </p:sp>
         </mc:Choice>
-        <mc:Fallback>
+        <mc:Fallback xmlns="">
           <p:sp>
             <p:nvSpPr>
               <p:cNvPr id="8" name="文本框 7">
@@ -18535,8 +18736,8 @@
           </p:sp>
         </mc:Fallback>
       </mc:AlternateContent>
-      <mc:AlternateContent xmlns:mc="http://schemas.openxmlformats.org/markup-compatibility/2006">
-        <mc:Choice xmlns:a14="http://schemas.microsoft.com/office/drawing/2010/main" Requires="a14">
+      <mc:AlternateContent xmlns:mc="http://schemas.openxmlformats.org/markup-compatibility/2006" xmlns:a14="http://schemas.microsoft.com/office/drawing/2010/main">
+        <mc:Choice Requires="a14">
           <p:sp>
             <p:nvSpPr>
               <p:cNvPr id="10" name="文本框 9">
@@ -18714,7 +18915,7 @@
             </p:txBody>
           </p:sp>
         </mc:Choice>
-        <mc:Fallback>
+        <mc:Fallback xmlns="">
           <p:sp>
             <p:nvSpPr>
               <p:cNvPr id="10" name="文本框 9">
@@ -19303,8 +19504,8 @@
           <a:chExt cx="0" cy="0"/>
         </a:xfrm>
       </p:grpSpPr>
-      <mc:AlternateContent xmlns:mc="http://schemas.openxmlformats.org/markup-compatibility/2006">
-        <mc:Choice xmlns:a14="http://schemas.microsoft.com/office/drawing/2010/main" Requires="a14">
+      <mc:AlternateContent xmlns:mc="http://schemas.openxmlformats.org/markup-compatibility/2006" xmlns:a14="http://schemas.microsoft.com/office/drawing/2010/main">
+        <mc:Choice Requires="a14">
           <p:sp>
             <p:nvSpPr>
               <p:cNvPr id="2" name="文本框 1">
@@ -19638,7 +19839,7 @@
             </p:txBody>
           </p:sp>
         </mc:Choice>
-        <mc:Fallback>
+        <mc:Fallback xmlns="">
           <p:sp>
             <p:nvSpPr>
               <p:cNvPr id="2" name="文本框 1">
@@ -23067,8 +23268,8 @@
           </a:p>
         </p:txBody>
       </p:sp>
-      <mc:AlternateContent xmlns:mc="http://schemas.openxmlformats.org/markup-compatibility/2006">
-        <mc:Choice xmlns:a14="http://schemas.microsoft.com/office/drawing/2010/main" Requires="a14">
+      <mc:AlternateContent xmlns:mc="http://schemas.openxmlformats.org/markup-compatibility/2006" xmlns:a14="http://schemas.microsoft.com/office/drawing/2010/main">
+        <mc:Choice Requires="a14">
           <p:sp>
             <p:nvSpPr>
               <p:cNvPr id="5" name="文本框 4">
@@ -23523,7 +23724,9 @@
                 <a14:m>
                   <m:oMath xmlns:m="http://schemas.openxmlformats.org/officeDocument/2006/math">
                     <m:r>
-                      <a:rPr lang="en-US" altLang="zh-CN" i="1"/>
+                      <a:rPr lang="en-US" altLang="zh-CN" i="1">
+                        <a:latin typeface="Cambria Math" panose="02040503050406030204" pitchFamily="18" charset="0"/>
+                      </a:rPr>
                       <m:t>𝑙</m:t>
                     </m:r>
                   </m:oMath>
@@ -23614,7 +23817,7 @@
             </p:txBody>
           </p:sp>
         </mc:Choice>
-        <mc:Fallback>
+        <mc:Fallback xmlns="">
           <p:sp>
             <p:nvSpPr>
               <p:cNvPr id="5" name="文本框 4">
@@ -23669,11 +23872,11 @@
   <p:clrMapOvr>
     <a:masterClrMapping/>
   </p:clrMapOvr>
-  <mc:AlternateContent xmlns:mc="http://schemas.openxmlformats.org/markup-compatibility/2006">
-    <mc:Choice xmlns:p14="http://schemas.microsoft.com/office/powerpoint/2010/main" Requires="p14">
+  <mc:AlternateContent xmlns:mc="http://schemas.openxmlformats.org/markup-compatibility/2006" xmlns:p14="http://schemas.microsoft.com/office/powerpoint/2010/main">
+    <mc:Choice Requires="p14">
       <p:transition p14:dur="10"/>
     </mc:Choice>
-    <mc:Fallback>
+    <mc:Fallback xmlns="">
       <p:transition/>
     </mc:Fallback>
   </mc:AlternateContent>
@@ -23697,1032 +23900,1053 @@
           <a:chExt cx="0" cy="0"/>
         </a:xfrm>
       </p:grpSpPr>
-      <p:pic>
-        <p:nvPicPr>
-          <p:cNvPr id="11" name="图片 10">
+      <p:grpSp>
+        <p:nvGrpSpPr>
+          <p:cNvPr id="2" name="组合 1">
             <a:extLst>
               <a:ext uri="{FF2B5EF4-FFF2-40B4-BE49-F238E27FC236}">
-                <a16:creationId xmlns:a16="http://schemas.microsoft.com/office/drawing/2014/main" id="{A03B70A3-8498-4C11-91C2-0FAA10A73F11}"/>
+                <a16:creationId xmlns:a16="http://schemas.microsoft.com/office/drawing/2014/main" id="{7563B09D-160B-4C39-A5DD-FC43CAC3093A}"/>
               </a:ext>
             </a:extLst>
           </p:cNvPr>
-          <p:cNvPicPr>
-            <a:picLocks noChangeAspect="1"/>
-          </p:cNvPicPr>
+          <p:cNvGrpSpPr/>
           <p:nvPr/>
-        </p:nvPicPr>
-        <p:blipFill>
-          <a:blip r:embed="rId3">
-            <a:extLst>
-              <a:ext uri="{28A0092B-C50C-407E-A947-70E740481C1C}">
-                <a14:useLocalDpi xmlns:a14="http://schemas.microsoft.com/office/drawing/2010/main" val="0"/>
-              </a:ext>
-            </a:extLst>
-          </a:blip>
-          <a:stretch>
-            <a:fillRect/>
-          </a:stretch>
-        </p:blipFill>
-        <p:spPr>
+        </p:nvGrpSpPr>
+        <p:grpSpPr>
           <a:xfrm>
-            <a:off x="4103948" y="2284512"/>
-            <a:ext cx="1080000" cy="1080000"/>
+            <a:off x="1943948" y="879219"/>
+            <a:ext cx="5472368" cy="3914563"/>
+            <a:chOff x="1943948" y="879219"/>
+            <a:chExt cx="5472368" cy="3914563"/>
           </a:xfrm>
-          <a:prstGeom prst="rect">
-            <a:avLst/>
-          </a:prstGeom>
-        </p:spPr>
-      </p:pic>
-      <p:pic>
-        <p:nvPicPr>
-          <p:cNvPr id="13" name="图片 12">
-            <a:extLst>
-              <a:ext uri="{FF2B5EF4-FFF2-40B4-BE49-F238E27FC236}">
-                <a16:creationId xmlns:a16="http://schemas.microsoft.com/office/drawing/2014/main" id="{66CA3E9D-E9B4-419C-A428-23B01F947604}"/>
-              </a:ext>
-            </a:extLst>
-          </p:cNvPr>
-          <p:cNvPicPr>
-            <a:picLocks noChangeAspect="1"/>
-          </p:cNvPicPr>
-          <p:nvPr/>
-        </p:nvPicPr>
-        <p:blipFill>
-          <a:blip r:embed="rId4">
-            <a:extLst>
-              <a:ext uri="{28A0092B-C50C-407E-A947-70E740481C1C}">
-                <a14:useLocalDpi xmlns:a14="http://schemas.microsoft.com/office/drawing/2010/main" val="0"/>
-              </a:ext>
-            </a:extLst>
-          </a:blip>
-          <a:stretch>
-            <a:fillRect/>
-          </a:stretch>
-        </p:blipFill>
-        <p:spPr>
-          <a:xfrm>
-            <a:off x="1943948" y="1204512"/>
-            <a:ext cx="1080000" cy="1080000"/>
-          </a:xfrm>
-          <a:prstGeom prst="rect">
-            <a:avLst/>
-          </a:prstGeom>
-        </p:spPr>
-      </p:pic>
-      <p:pic>
-        <p:nvPicPr>
-          <p:cNvPr id="15" name="图片 14">
-            <a:extLst>
-              <a:ext uri="{FF2B5EF4-FFF2-40B4-BE49-F238E27FC236}">
-                <a16:creationId xmlns:a16="http://schemas.microsoft.com/office/drawing/2014/main" id="{91C4CC97-BC7E-4FBB-877A-C8D1DD084041}"/>
-              </a:ext>
-            </a:extLst>
-          </p:cNvPr>
-          <p:cNvPicPr>
-            <a:picLocks noChangeAspect="1"/>
-          </p:cNvPicPr>
-          <p:nvPr/>
-        </p:nvPicPr>
-        <p:blipFill>
-          <a:blip r:embed="rId5">
-            <a:extLst>
-              <a:ext uri="{28A0092B-C50C-407E-A947-70E740481C1C}">
-                <a14:useLocalDpi xmlns:a14="http://schemas.microsoft.com/office/drawing/2010/main" val="0"/>
-              </a:ext>
-            </a:extLst>
-          </a:blip>
-          <a:stretch>
-            <a:fillRect/>
-          </a:stretch>
-        </p:blipFill>
-        <p:spPr>
-          <a:xfrm>
-            <a:off x="3023948" y="1204512"/>
-            <a:ext cx="1080000" cy="1080000"/>
-          </a:xfrm>
-          <a:prstGeom prst="rect">
-            <a:avLst/>
-          </a:prstGeom>
-        </p:spPr>
-      </p:pic>
-      <p:pic>
-        <p:nvPicPr>
-          <p:cNvPr id="17" name="图片 16">
-            <a:extLst>
-              <a:ext uri="{FF2B5EF4-FFF2-40B4-BE49-F238E27FC236}">
-                <a16:creationId xmlns:a16="http://schemas.microsoft.com/office/drawing/2014/main" id="{ED1E064E-1759-4FCB-A50A-727B8EA94947}"/>
-              </a:ext>
-            </a:extLst>
-          </p:cNvPr>
-          <p:cNvPicPr>
-            <a:picLocks noChangeAspect="1"/>
-          </p:cNvPicPr>
-          <p:nvPr/>
-        </p:nvPicPr>
-        <p:blipFill>
-          <a:blip r:embed="rId6">
-            <a:extLst>
-              <a:ext uri="{28A0092B-C50C-407E-A947-70E740481C1C}">
-                <a14:useLocalDpi xmlns:a14="http://schemas.microsoft.com/office/drawing/2010/main" val="0"/>
-              </a:ext>
-            </a:extLst>
-          </a:blip>
-          <a:stretch>
-            <a:fillRect/>
-          </a:stretch>
-        </p:blipFill>
-        <p:spPr>
-          <a:xfrm>
-            <a:off x="5183948" y="1207556"/>
-            <a:ext cx="1080000" cy="1080000"/>
-          </a:xfrm>
-          <a:prstGeom prst="rect">
-            <a:avLst/>
-          </a:prstGeom>
-        </p:spPr>
-      </p:pic>
-      <p:pic>
-        <p:nvPicPr>
-          <p:cNvPr id="19" name="图片 18">
-            <a:extLst>
-              <a:ext uri="{FF2B5EF4-FFF2-40B4-BE49-F238E27FC236}">
-                <a16:creationId xmlns:a16="http://schemas.microsoft.com/office/drawing/2014/main" id="{570F38E1-6438-48AE-8927-5F77A5DFC9BE}"/>
-              </a:ext>
-            </a:extLst>
-          </p:cNvPr>
-          <p:cNvPicPr>
-            <a:picLocks noChangeAspect="1"/>
-          </p:cNvPicPr>
-          <p:nvPr/>
-        </p:nvPicPr>
-        <p:blipFill>
-          <a:blip r:embed="rId7">
-            <a:extLst>
-              <a:ext uri="{28A0092B-C50C-407E-A947-70E740481C1C}">
-                <a14:useLocalDpi xmlns:a14="http://schemas.microsoft.com/office/drawing/2010/main" val="0"/>
-              </a:ext>
-            </a:extLst>
-          </a:blip>
-          <a:stretch>
-            <a:fillRect/>
-          </a:stretch>
-        </p:blipFill>
-        <p:spPr>
-          <a:xfrm>
-            <a:off x="6263948" y="1207556"/>
-            <a:ext cx="1080000" cy="1080000"/>
-          </a:xfrm>
-          <a:prstGeom prst="rect">
-            <a:avLst/>
-          </a:prstGeom>
-        </p:spPr>
-      </p:pic>
-      <p:pic>
-        <p:nvPicPr>
-          <p:cNvPr id="21" name="图片 20">
-            <a:extLst>
-              <a:ext uri="{FF2B5EF4-FFF2-40B4-BE49-F238E27FC236}">
-                <a16:creationId xmlns:a16="http://schemas.microsoft.com/office/drawing/2014/main" id="{538BD140-A657-45F0-A41E-A2FD0950C0AA}"/>
-              </a:ext>
-            </a:extLst>
-          </p:cNvPr>
-          <p:cNvPicPr>
-            <a:picLocks noChangeAspect="1"/>
-          </p:cNvPicPr>
-          <p:nvPr/>
-        </p:nvPicPr>
-        <p:blipFill>
-          <a:blip r:embed="rId8">
-            <a:extLst>
-              <a:ext uri="{28A0092B-C50C-407E-A947-70E740481C1C}">
-                <a14:useLocalDpi xmlns:a14="http://schemas.microsoft.com/office/drawing/2010/main" val="0"/>
-              </a:ext>
-            </a:extLst>
-          </a:blip>
-          <a:stretch>
-            <a:fillRect/>
-          </a:stretch>
-        </p:blipFill>
-        <p:spPr>
-          <a:xfrm>
-            <a:off x="1943948" y="3369495"/>
-            <a:ext cx="1080000" cy="1080000"/>
-          </a:xfrm>
-          <a:prstGeom prst="rect">
-            <a:avLst/>
-          </a:prstGeom>
-        </p:spPr>
-      </p:pic>
-      <p:pic>
-        <p:nvPicPr>
-          <p:cNvPr id="23" name="图片 22">
-            <a:extLst>
-              <a:ext uri="{FF2B5EF4-FFF2-40B4-BE49-F238E27FC236}">
-                <a16:creationId xmlns:a16="http://schemas.microsoft.com/office/drawing/2014/main" id="{41446B84-8610-4976-B8CC-C8292E1DC67F}"/>
-              </a:ext>
-            </a:extLst>
-          </p:cNvPr>
-          <p:cNvPicPr>
-            <a:picLocks noChangeAspect="1"/>
-          </p:cNvPicPr>
-          <p:nvPr/>
-        </p:nvPicPr>
-        <p:blipFill>
-          <a:blip r:embed="rId9">
-            <a:extLst>
-              <a:ext uri="{28A0092B-C50C-407E-A947-70E740481C1C}">
-                <a14:useLocalDpi xmlns:a14="http://schemas.microsoft.com/office/drawing/2010/main" val="0"/>
-              </a:ext>
-            </a:extLst>
-          </a:blip>
-          <a:stretch>
-            <a:fillRect/>
-          </a:stretch>
-        </p:blipFill>
-        <p:spPr>
-          <a:xfrm>
-            <a:off x="3023948" y="3369495"/>
-            <a:ext cx="1080000" cy="1080000"/>
-          </a:xfrm>
-          <a:prstGeom prst="rect">
-            <a:avLst/>
-          </a:prstGeom>
-        </p:spPr>
-      </p:pic>
-      <p:pic>
-        <p:nvPicPr>
-          <p:cNvPr id="25" name="图片 24">
-            <a:extLst>
-              <a:ext uri="{FF2B5EF4-FFF2-40B4-BE49-F238E27FC236}">
-                <a16:creationId xmlns:a16="http://schemas.microsoft.com/office/drawing/2014/main" id="{237F6B25-FED9-4B1D-A421-E4FB63DC9993}"/>
-              </a:ext>
-            </a:extLst>
-          </p:cNvPr>
-          <p:cNvPicPr>
-            <a:picLocks noChangeAspect="1"/>
-          </p:cNvPicPr>
-          <p:nvPr/>
-        </p:nvPicPr>
-        <p:blipFill>
-          <a:blip r:embed="rId10">
-            <a:extLst>
-              <a:ext uri="{28A0092B-C50C-407E-A947-70E740481C1C}">
-                <a14:useLocalDpi xmlns:a14="http://schemas.microsoft.com/office/drawing/2010/main" val="0"/>
-              </a:ext>
-            </a:extLst>
-          </a:blip>
-          <a:stretch>
-            <a:fillRect/>
-          </a:stretch>
-        </p:blipFill>
-        <p:spPr>
-          <a:xfrm>
-            <a:off x="5183948" y="3369495"/>
-            <a:ext cx="1080000" cy="1080000"/>
-          </a:xfrm>
-          <a:prstGeom prst="rect">
-            <a:avLst/>
-          </a:prstGeom>
-        </p:spPr>
-      </p:pic>
-      <p:pic>
-        <p:nvPicPr>
-          <p:cNvPr id="27" name="图片 26">
-            <a:extLst>
-              <a:ext uri="{FF2B5EF4-FFF2-40B4-BE49-F238E27FC236}">
-                <a16:creationId xmlns:a16="http://schemas.microsoft.com/office/drawing/2014/main" id="{E9A36241-9567-498D-90A6-33725CCA4C84}"/>
-              </a:ext>
-            </a:extLst>
-          </p:cNvPr>
-          <p:cNvPicPr>
-            <a:picLocks noChangeAspect="1"/>
-          </p:cNvPicPr>
-          <p:nvPr/>
-        </p:nvPicPr>
-        <p:blipFill>
-          <a:blip r:embed="rId11">
-            <a:extLst>
-              <a:ext uri="{28A0092B-C50C-407E-A947-70E740481C1C}">
-                <a14:useLocalDpi xmlns:a14="http://schemas.microsoft.com/office/drawing/2010/main" val="0"/>
-              </a:ext>
-            </a:extLst>
-          </a:blip>
-          <a:stretch>
-            <a:fillRect/>
-          </a:stretch>
-        </p:blipFill>
-        <p:spPr>
-          <a:xfrm>
-            <a:off x="6263948" y="3369495"/>
-            <a:ext cx="1080000" cy="1080000"/>
-          </a:xfrm>
-          <a:prstGeom prst="rect">
-            <a:avLst/>
-          </a:prstGeom>
-        </p:spPr>
-      </p:pic>
-      <mc:AlternateContent xmlns:mc="http://schemas.openxmlformats.org/markup-compatibility/2006">
-        <mc:Choice xmlns:a14="http://schemas.microsoft.com/office/drawing/2010/main" Requires="a14">
-          <p:sp>
-            <p:nvSpPr>
-              <p:cNvPr id="28" name="文本框 27">
-                <a:extLst>
-                  <a:ext uri="{FF2B5EF4-FFF2-40B4-BE49-F238E27FC236}">
-                    <a16:creationId xmlns:a16="http://schemas.microsoft.com/office/drawing/2014/main" id="{434717EE-09FC-4361-A287-1CFB82F28DA0}"/>
-                  </a:ext>
-                </a:extLst>
-              </p:cNvPr>
-              <p:cNvSpPr txBox="1"/>
-              <p:nvPr/>
-            </p:nvSpPr>
-            <p:spPr>
-              <a:xfrm>
-                <a:off x="1943948" y="880379"/>
-                <a:ext cx="2160000" cy="276999"/>
-              </a:xfrm>
-              <a:prstGeom prst="rect">
-                <a:avLst/>
-              </a:prstGeom>
-              <a:noFill/>
-            </p:spPr>
-            <p:txBody>
-              <a:bodyPr wrap="square" rtlCol="0">
-                <a:spAutoFit/>
-              </a:bodyPr>
-              <a:lstStyle/>
-              <a:p>
-                <a:r>
-                  <a:rPr lang="zh-CN" altLang="en-US" sz="1200" dirty="0"/>
-                  <a:t>线圈灵敏度</a:t>
-                </a:r>
-                <a14:m>
-                  <m:oMath xmlns:m="http://schemas.openxmlformats.org/officeDocument/2006/math">
-                    <m:sSub>
-                      <m:sSubPr>
-                        <m:ctrlPr>
-                          <a:rPr lang="en-US" altLang="zh-CN" sz="1200" b="0" i="1" dirty="0" smtClean="0">
-                            <a:latin typeface="Cambria Math" panose="02040503050406030204" pitchFamily="18" charset="0"/>
-                          </a:rPr>
-                        </m:ctrlPr>
-                      </m:sSubPr>
-                      <m:e>
-                        <m:r>
-                          <a:rPr lang="en-US" altLang="zh-CN" sz="1200" i="1" dirty="0" smtClean="0">
-                            <a:latin typeface="Cambria Math" panose="02040503050406030204" pitchFamily="18" charset="0"/>
-                          </a:rPr>
-                          <m:t>𝑆</m:t>
-                        </m:r>
-                      </m:e>
-                      <m:sub>
-                        <m:r>
-                          <a:rPr lang="en-US" altLang="zh-CN" sz="1200" b="0" i="1" dirty="0" smtClean="0">
-                            <a:latin typeface="Cambria Math" panose="02040503050406030204" pitchFamily="18" charset="0"/>
-                          </a:rPr>
-                          <m:t>1</m:t>
-                        </m:r>
-                      </m:sub>
-                    </m:sSub>
-                    <m:r>
-                      <a:rPr lang="en-US" altLang="zh-CN" sz="1200" b="0" i="1" dirty="0" smtClean="0">
-                        <a:latin typeface="Cambria Math" panose="02040503050406030204" pitchFamily="18" charset="0"/>
-                      </a:rPr>
-                      <m:t>      </m:t>
-                    </m:r>
-                  </m:oMath>
-                </a14:m>
-                <a:r>
-                  <a:rPr lang="zh-CN" altLang="en-US" sz="1200" dirty="0"/>
-                  <a:t>线圈图像</a:t>
-                </a:r>
-                <a14:m>
-                  <m:oMath xmlns:m="http://schemas.openxmlformats.org/officeDocument/2006/math">
-                    <m:sSub>
-                      <m:sSubPr>
-                        <m:ctrlPr>
-                          <a:rPr lang="en-US" altLang="zh-CN" sz="1200" i="1" dirty="0" smtClean="0">
-                            <a:latin typeface="Cambria Math" panose="02040503050406030204" pitchFamily="18" charset="0"/>
-                          </a:rPr>
-                        </m:ctrlPr>
-                      </m:sSubPr>
-                      <m:e>
-                        <m:r>
-                          <a:rPr lang="en-US" altLang="zh-CN" sz="1200" i="1" dirty="0" smtClean="0">
-                            <a:latin typeface="Cambria Math" panose="02040503050406030204" pitchFamily="18" charset="0"/>
-                          </a:rPr>
-                          <m:t>𝑚</m:t>
-                        </m:r>
-                      </m:e>
-                      <m:sub>
-                        <m:r>
-                          <a:rPr lang="en-US" altLang="zh-CN" sz="1200" b="0" i="1" dirty="0" smtClean="0">
-                            <a:latin typeface="Cambria Math" panose="02040503050406030204" pitchFamily="18" charset="0"/>
-                          </a:rPr>
-                          <m:t>1</m:t>
-                        </m:r>
-                      </m:sub>
-                    </m:sSub>
-                  </m:oMath>
-                </a14:m>
-                <a:endParaRPr lang="zh-CN" altLang="en-US" sz="1200" dirty="0"/>
-              </a:p>
-            </p:txBody>
-          </p:sp>
-        </mc:Choice>
-        <mc:Fallback>
-          <p:sp>
-            <p:nvSpPr>
-              <p:cNvPr id="28" name="文本框 27">
-                <a:extLst>
-                  <a:ext uri="{FF2B5EF4-FFF2-40B4-BE49-F238E27FC236}">
-                    <a16:creationId xmlns:a16="http://schemas.microsoft.com/office/drawing/2014/main" id="{434717EE-09FC-4361-A287-1CFB82F28DA0}"/>
-                  </a:ext>
-                </a:extLst>
-              </p:cNvPr>
-              <p:cNvSpPr txBox="1">
-                <a:spLocks noRot="1" noChangeAspect="1" noMove="1" noResize="1" noEditPoints="1" noAdjustHandles="1" noChangeArrowheads="1" noChangeShapeType="1" noTextEdit="1"/>
-              </p:cNvSpPr>
-              <p:nvPr/>
-            </p:nvSpPr>
-            <p:spPr>
-              <a:xfrm>
-                <a:off x="1943948" y="880379"/>
-                <a:ext cx="2160000" cy="276999"/>
-              </a:xfrm>
-              <a:prstGeom prst="rect">
-                <a:avLst/>
-              </a:prstGeom>
-              <a:blipFill>
-                <a:blip r:embed="rId12"/>
-                <a:stretch>
-                  <a:fillRect l="-282" t="-2174" b="-13043"/>
-                </a:stretch>
-              </a:blipFill>
-            </p:spPr>
-            <p:txBody>
-              <a:bodyPr/>
-              <a:lstStyle/>
-              <a:p>
-                <a:r>
-                  <a:rPr lang="zh-CN" altLang="en-US">
-                    <a:noFill/>
-                  </a:rPr>
-                  <a:t> </a:t>
-                </a:r>
-              </a:p>
-            </p:txBody>
-          </p:sp>
-        </mc:Fallback>
-      </mc:AlternateContent>
-      <mc:AlternateContent xmlns:mc="http://schemas.openxmlformats.org/markup-compatibility/2006">
-        <mc:Choice xmlns:a14="http://schemas.microsoft.com/office/drawing/2010/main" Requires="a14">
-          <p:sp>
-            <p:nvSpPr>
-              <p:cNvPr id="29" name="文本框 28">
-                <a:extLst>
-                  <a:ext uri="{FF2B5EF4-FFF2-40B4-BE49-F238E27FC236}">
-                    <a16:creationId xmlns:a16="http://schemas.microsoft.com/office/drawing/2014/main" id="{338AABAB-90B5-4353-B70B-60E98778D259}"/>
-                  </a:ext>
-                </a:extLst>
-              </p:cNvPr>
-              <p:cNvSpPr txBox="1"/>
-              <p:nvPr/>
-            </p:nvSpPr>
-            <p:spPr>
-              <a:xfrm>
-                <a:off x="2015956" y="4516783"/>
-                <a:ext cx="2160000" cy="276999"/>
-              </a:xfrm>
-              <a:prstGeom prst="rect">
-                <a:avLst/>
-              </a:prstGeom>
-              <a:noFill/>
-            </p:spPr>
-            <p:txBody>
-              <a:bodyPr wrap="square" rtlCol="0">
-                <a:spAutoFit/>
-              </a:bodyPr>
-              <a:lstStyle/>
-              <a:p>
-                <a:r>
-                  <a:rPr lang="zh-CN" altLang="en-US" sz="1200" dirty="0"/>
-                  <a:t>线圈灵敏度</a:t>
-                </a:r>
-                <a14:m>
-                  <m:oMath xmlns:m="http://schemas.openxmlformats.org/officeDocument/2006/math">
-                    <m:sSub>
-                      <m:sSubPr>
-                        <m:ctrlPr>
-                          <a:rPr lang="en-US" altLang="zh-CN" sz="1200" b="0" i="1" dirty="0" smtClean="0">
-                            <a:latin typeface="Cambria Math" panose="02040503050406030204" pitchFamily="18" charset="0"/>
-                          </a:rPr>
-                        </m:ctrlPr>
-                      </m:sSubPr>
-                      <m:e>
-                        <m:r>
-                          <a:rPr lang="en-US" altLang="zh-CN" sz="1200" i="1" dirty="0" smtClean="0">
-                            <a:latin typeface="Cambria Math" panose="02040503050406030204" pitchFamily="18" charset="0"/>
-                          </a:rPr>
-                          <m:t>𝑆</m:t>
-                        </m:r>
-                      </m:e>
-                      <m:sub>
-                        <m:r>
-                          <a:rPr lang="en-US" altLang="zh-CN" sz="1200" b="0" i="1" dirty="0" smtClean="0">
-                            <a:latin typeface="Cambria Math" panose="02040503050406030204" pitchFamily="18" charset="0"/>
-                          </a:rPr>
-                          <m:t>3</m:t>
-                        </m:r>
-                      </m:sub>
-                    </m:sSub>
-                    <m:r>
-                      <a:rPr lang="en-US" altLang="zh-CN" sz="1200" b="0" i="1" dirty="0" smtClean="0">
-                        <a:latin typeface="Cambria Math" panose="02040503050406030204" pitchFamily="18" charset="0"/>
-                      </a:rPr>
-                      <m:t>      </m:t>
-                    </m:r>
-                  </m:oMath>
-                </a14:m>
-                <a:r>
-                  <a:rPr lang="zh-CN" altLang="en-US" sz="1200" dirty="0"/>
-                  <a:t>线圈图像</a:t>
-                </a:r>
-                <a14:m>
-                  <m:oMath xmlns:m="http://schemas.openxmlformats.org/officeDocument/2006/math">
-                    <m:sSub>
-                      <m:sSubPr>
-                        <m:ctrlPr>
-                          <a:rPr lang="en-US" altLang="zh-CN" sz="1200" i="1" dirty="0" smtClean="0">
-                            <a:latin typeface="Cambria Math" panose="02040503050406030204" pitchFamily="18" charset="0"/>
-                          </a:rPr>
-                        </m:ctrlPr>
-                      </m:sSubPr>
-                      <m:e>
-                        <m:r>
-                          <a:rPr lang="en-US" altLang="zh-CN" sz="1200" i="1" dirty="0" smtClean="0">
-                            <a:latin typeface="Cambria Math" panose="02040503050406030204" pitchFamily="18" charset="0"/>
-                          </a:rPr>
-                          <m:t>𝑚</m:t>
-                        </m:r>
-                      </m:e>
-                      <m:sub>
-                        <m:r>
-                          <a:rPr lang="en-US" altLang="zh-CN" sz="1200" b="0" i="1" dirty="0" smtClean="0">
-                            <a:latin typeface="Cambria Math" panose="02040503050406030204" pitchFamily="18" charset="0"/>
-                          </a:rPr>
-                          <m:t>3</m:t>
-                        </m:r>
-                      </m:sub>
-                    </m:sSub>
-                  </m:oMath>
-                </a14:m>
-                <a:endParaRPr lang="zh-CN" altLang="en-US" sz="1200" dirty="0"/>
-              </a:p>
-            </p:txBody>
-          </p:sp>
-        </mc:Choice>
-        <mc:Fallback>
-          <p:sp>
-            <p:nvSpPr>
-              <p:cNvPr id="29" name="文本框 28">
-                <a:extLst>
-                  <a:ext uri="{FF2B5EF4-FFF2-40B4-BE49-F238E27FC236}">
-                    <a16:creationId xmlns:a16="http://schemas.microsoft.com/office/drawing/2014/main" id="{338AABAB-90B5-4353-B70B-60E98778D259}"/>
-                  </a:ext>
-                </a:extLst>
-              </p:cNvPr>
-              <p:cNvSpPr txBox="1">
-                <a:spLocks noRot="1" noChangeAspect="1" noMove="1" noResize="1" noEditPoints="1" noAdjustHandles="1" noChangeArrowheads="1" noChangeShapeType="1" noTextEdit="1"/>
-              </p:cNvSpPr>
-              <p:nvPr/>
-            </p:nvSpPr>
-            <p:spPr>
-              <a:xfrm>
-                <a:off x="2015956" y="4516783"/>
-                <a:ext cx="2160000" cy="276999"/>
-              </a:xfrm>
-              <a:prstGeom prst="rect">
-                <a:avLst/>
-              </a:prstGeom>
-              <a:blipFill>
-                <a:blip r:embed="rId13"/>
-                <a:stretch>
-                  <a:fillRect l="-282" t="-4444" b="-15556"/>
-                </a:stretch>
-              </a:blipFill>
-            </p:spPr>
-            <p:txBody>
-              <a:bodyPr/>
-              <a:lstStyle/>
-              <a:p>
-                <a:r>
-                  <a:rPr lang="zh-CN" altLang="en-US">
-                    <a:noFill/>
-                  </a:rPr>
-                  <a:t> </a:t>
-                </a:r>
-              </a:p>
-            </p:txBody>
-          </p:sp>
-        </mc:Fallback>
-      </mc:AlternateContent>
-      <mc:AlternateContent xmlns:mc="http://schemas.openxmlformats.org/markup-compatibility/2006">
-        <mc:Choice xmlns:a14="http://schemas.microsoft.com/office/drawing/2010/main" Requires="a14">
-          <p:sp>
-            <p:nvSpPr>
-              <p:cNvPr id="30" name="文本框 29">
-                <a:extLst>
-                  <a:ext uri="{FF2B5EF4-FFF2-40B4-BE49-F238E27FC236}">
-                    <a16:creationId xmlns:a16="http://schemas.microsoft.com/office/drawing/2014/main" id="{0467A768-98E8-4A67-A2FE-915B5EED4158}"/>
-                  </a:ext>
-                </a:extLst>
-              </p:cNvPr>
-              <p:cNvSpPr txBox="1"/>
-              <p:nvPr/>
-            </p:nvSpPr>
-            <p:spPr>
-              <a:xfrm>
-                <a:off x="5256316" y="879219"/>
-                <a:ext cx="2160000" cy="276999"/>
-              </a:xfrm>
-              <a:prstGeom prst="rect">
-                <a:avLst/>
-              </a:prstGeom>
-              <a:noFill/>
-            </p:spPr>
-            <p:txBody>
-              <a:bodyPr wrap="square" rtlCol="0">
-                <a:spAutoFit/>
-              </a:bodyPr>
-              <a:lstStyle/>
-              <a:p>
-                <a:r>
-                  <a:rPr lang="zh-CN" altLang="en-US" sz="1200" dirty="0"/>
-                  <a:t>线圈灵敏度</a:t>
-                </a:r>
-                <a14:m>
-                  <m:oMath xmlns:m="http://schemas.openxmlformats.org/officeDocument/2006/math">
-                    <m:sSub>
-                      <m:sSubPr>
-                        <m:ctrlPr>
-                          <a:rPr lang="en-US" altLang="zh-CN" sz="1200" b="0" i="1" dirty="0" smtClean="0">
-                            <a:latin typeface="Cambria Math" panose="02040503050406030204" pitchFamily="18" charset="0"/>
-                          </a:rPr>
-                        </m:ctrlPr>
-                      </m:sSubPr>
-                      <m:e>
-                        <m:r>
-                          <a:rPr lang="en-US" altLang="zh-CN" sz="1200" i="1" dirty="0" smtClean="0">
-                            <a:latin typeface="Cambria Math" panose="02040503050406030204" pitchFamily="18" charset="0"/>
-                          </a:rPr>
-                          <m:t>𝑆</m:t>
-                        </m:r>
-                      </m:e>
-                      <m:sub>
-                        <m:r>
-                          <a:rPr lang="en-US" altLang="zh-CN" sz="1200" b="0" i="1" dirty="0" smtClean="0">
-                            <a:latin typeface="Cambria Math" panose="02040503050406030204" pitchFamily="18" charset="0"/>
-                          </a:rPr>
-                          <m:t>2</m:t>
-                        </m:r>
-                      </m:sub>
-                    </m:sSub>
-                    <m:r>
-                      <a:rPr lang="en-US" altLang="zh-CN" sz="1200" b="0" i="1" dirty="0" smtClean="0">
-                        <a:latin typeface="Cambria Math" panose="02040503050406030204" pitchFamily="18" charset="0"/>
-                      </a:rPr>
-                      <m:t>      </m:t>
-                    </m:r>
-                  </m:oMath>
-                </a14:m>
-                <a:r>
-                  <a:rPr lang="zh-CN" altLang="en-US" sz="1200" dirty="0"/>
-                  <a:t>线圈图像</a:t>
-                </a:r>
-                <a14:m>
-                  <m:oMath xmlns:m="http://schemas.openxmlformats.org/officeDocument/2006/math">
-                    <m:sSub>
-                      <m:sSubPr>
-                        <m:ctrlPr>
-                          <a:rPr lang="en-US" altLang="zh-CN" sz="1200" i="1" dirty="0" smtClean="0">
-                            <a:latin typeface="Cambria Math" panose="02040503050406030204" pitchFamily="18" charset="0"/>
-                          </a:rPr>
-                        </m:ctrlPr>
-                      </m:sSubPr>
-                      <m:e>
-                        <m:r>
-                          <a:rPr lang="en-US" altLang="zh-CN" sz="1200" i="1" dirty="0" smtClean="0">
-                            <a:latin typeface="Cambria Math" panose="02040503050406030204" pitchFamily="18" charset="0"/>
-                          </a:rPr>
-                          <m:t>𝑚</m:t>
-                        </m:r>
-                      </m:e>
-                      <m:sub>
-                        <m:r>
-                          <a:rPr lang="en-US" altLang="zh-CN" sz="1200" b="0" i="1" dirty="0" smtClean="0">
-                            <a:latin typeface="Cambria Math" panose="02040503050406030204" pitchFamily="18" charset="0"/>
-                          </a:rPr>
-                          <m:t>2</m:t>
-                        </m:r>
-                      </m:sub>
-                    </m:sSub>
-                  </m:oMath>
-                </a14:m>
-                <a:endParaRPr lang="zh-CN" altLang="en-US" sz="1200" dirty="0"/>
-              </a:p>
-            </p:txBody>
-          </p:sp>
-        </mc:Choice>
-        <mc:Fallback>
-          <p:sp>
-            <p:nvSpPr>
-              <p:cNvPr id="30" name="文本框 29">
-                <a:extLst>
-                  <a:ext uri="{FF2B5EF4-FFF2-40B4-BE49-F238E27FC236}">
-                    <a16:creationId xmlns:a16="http://schemas.microsoft.com/office/drawing/2014/main" id="{0467A768-98E8-4A67-A2FE-915B5EED4158}"/>
-                  </a:ext>
-                </a:extLst>
-              </p:cNvPr>
-              <p:cNvSpPr txBox="1">
-                <a:spLocks noRot="1" noChangeAspect="1" noMove="1" noResize="1" noEditPoints="1" noAdjustHandles="1" noChangeArrowheads="1" noChangeShapeType="1" noTextEdit="1"/>
-              </p:cNvSpPr>
-              <p:nvPr/>
-            </p:nvSpPr>
-            <p:spPr>
-              <a:xfrm>
-                <a:off x="5256316" y="879219"/>
-                <a:ext cx="2160000" cy="276999"/>
-              </a:xfrm>
-              <a:prstGeom prst="rect">
-                <a:avLst/>
-              </a:prstGeom>
-              <a:blipFill>
-                <a:blip r:embed="rId14"/>
-                <a:stretch>
-                  <a:fillRect t="-2174" b="-13043"/>
-                </a:stretch>
-              </a:blipFill>
-            </p:spPr>
-            <p:txBody>
-              <a:bodyPr/>
-              <a:lstStyle/>
-              <a:p>
-                <a:r>
-                  <a:rPr lang="zh-CN" altLang="en-US">
-                    <a:noFill/>
-                  </a:rPr>
-                  <a:t> </a:t>
-                </a:r>
-              </a:p>
-            </p:txBody>
-          </p:sp>
-        </mc:Fallback>
-      </mc:AlternateContent>
-      <mc:AlternateContent xmlns:mc="http://schemas.openxmlformats.org/markup-compatibility/2006">
-        <mc:Choice xmlns:a14="http://schemas.microsoft.com/office/drawing/2010/main" Requires="a14">
-          <p:sp>
-            <p:nvSpPr>
-              <p:cNvPr id="31" name="文本框 30">
-                <a:extLst>
-                  <a:ext uri="{FF2B5EF4-FFF2-40B4-BE49-F238E27FC236}">
-                    <a16:creationId xmlns:a16="http://schemas.microsoft.com/office/drawing/2014/main" id="{21C84E98-8F00-413B-A4D1-4EE548E54189}"/>
-                  </a:ext>
-                </a:extLst>
-              </p:cNvPr>
-              <p:cNvSpPr txBox="1"/>
-              <p:nvPr/>
-            </p:nvSpPr>
-            <p:spPr>
-              <a:xfrm>
-                <a:off x="5256316" y="4515623"/>
-                <a:ext cx="2160000" cy="276999"/>
-              </a:xfrm>
-              <a:prstGeom prst="rect">
-                <a:avLst/>
-              </a:prstGeom>
-              <a:noFill/>
-            </p:spPr>
-            <p:txBody>
-              <a:bodyPr wrap="square" rtlCol="0">
-                <a:spAutoFit/>
-              </a:bodyPr>
-              <a:lstStyle/>
-              <a:p>
-                <a:r>
-                  <a:rPr lang="zh-CN" altLang="en-US" sz="1200" dirty="0"/>
-                  <a:t>线圈灵敏度</a:t>
-                </a:r>
-                <a14:m>
-                  <m:oMath xmlns:m="http://schemas.openxmlformats.org/officeDocument/2006/math">
-                    <m:sSub>
-                      <m:sSubPr>
-                        <m:ctrlPr>
-                          <a:rPr lang="en-US" altLang="zh-CN" sz="1200" b="0" i="1" dirty="0" smtClean="0">
-                            <a:latin typeface="Cambria Math" panose="02040503050406030204" pitchFamily="18" charset="0"/>
-                          </a:rPr>
-                        </m:ctrlPr>
-                      </m:sSubPr>
-                      <m:e>
-                        <m:r>
-                          <a:rPr lang="en-US" altLang="zh-CN" sz="1200" i="1" dirty="0" smtClean="0">
-                            <a:latin typeface="Cambria Math" panose="02040503050406030204" pitchFamily="18" charset="0"/>
-                          </a:rPr>
-                          <m:t>𝑆</m:t>
-                        </m:r>
-                      </m:e>
-                      <m:sub>
-                        <m:r>
-                          <a:rPr lang="en-US" altLang="zh-CN" sz="1200" b="0" i="1" dirty="0" smtClean="0">
-                            <a:latin typeface="Cambria Math" panose="02040503050406030204" pitchFamily="18" charset="0"/>
-                          </a:rPr>
-                          <m:t>4</m:t>
-                        </m:r>
-                      </m:sub>
-                    </m:sSub>
-                    <m:r>
-                      <a:rPr lang="en-US" altLang="zh-CN" sz="1200" b="0" i="1" dirty="0" smtClean="0">
-                        <a:latin typeface="Cambria Math" panose="02040503050406030204" pitchFamily="18" charset="0"/>
-                      </a:rPr>
-                      <m:t>      </m:t>
-                    </m:r>
-                  </m:oMath>
-                </a14:m>
-                <a:r>
-                  <a:rPr lang="zh-CN" altLang="en-US" sz="1200" dirty="0"/>
-                  <a:t>线圈图像</a:t>
-                </a:r>
-                <a14:m>
-                  <m:oMath xmlns:m="http://schemas.openxmlformats.org/officeDocument/2006/math">
-                    <m:sSub>
-                      <m:sSubPr>
-                        <m:ctrlPr>
-                          <a:rPr lang="en-US" altLang="zh-CN" sz="1200" i="1" dirty="0" smtClean="0">
-                            <a:latin typeface="Cambria Math" panose="02040503050406030204" pitchFamily="18" charset="0"/>
-                          </a:rPr>
-                        </m:ctrlPr>
-                      </m:sSubPr>
-                      <m:e>
-                        <m:r>
-                          <a:rPr lang="en-US" altLang="zh-CN" sz="1200" i="1" dirty="0" smtClean="0">
-                            <a:latin typeface="Cambria Math" panose="02040503050406030204" pitchFamily="18" charset="0"/>
-                          </a:rPr>
-                          <m:t>𝑚</m:t>
-                        </m:r>
-                      </m:e>
-                      <m:sub>
-                        <m:r>
-                          <a:rPr lang="en-US" altLang="zh-CN" sz="1200" b="0" i="1" dirty="0" smtClean="0">
-                            <a:latin typeface="Cambria Math" panose="02040503050406030204" pitchFamily="18" charset="0"/>
-                          </a:rPr>
-                          <m:t>4</m:t>
-                        </m:r>
-                      </m:sub>
-                    </m:sSub>
-                  </m:oMath>
-                </a14:m>
-                <a:endParaRPr lang="zh-CN" altLang="en-US" sz="1200" dirty="0"/>
-              </a:p>
-            </p:txBody>
-          </p:sp>
-        </mc:Choice>
-        <mc:Fallback>
-          <p:sp>
-            <p:nvSpPr>
-              <p:cNvPr id="31" name="文本框 30">
-                <a:extLst>
-                  <a:ext uri="{FF2B5EF4-FFF2-40B4-BE49-F238E27FC236}">
-                    <a16:creationId xmlns:a16="http://schemas.microsoft.com/office/drawing/2014/main" id="{21C84E98-8F00-413B-A4D1-4EE548E54189}"/>
-                  </a:ext>
-                </a:extLst>
-              </p:cNvPr>
-              <p:cNvSpPr txBox="1">
-                <a:spLocks noRot="1" noChangeAspect="1" noMove="1" noResize="1" noEditPoints="1" noAdjustHandles="1" noChangeArrowheads="1" noChangeShapeType="1" noTextEdit="1"/>
-              </p:cNvSpPr>
-              <p:nvPr/>
-            </p:nvSpPr>
-            <p:spPr>
-              <a:xfrm>
-                <a:off x="5256316" y="4515623"/>
-                <a:ext cx="2160000" cy="276999"/>
-              </a:xfrm>
-              <a:prstGeom prst="rect">
-                <a:avLst/>
-              </a:prstGeom>
-              <a:blipFill>
-                <a:blip r:embed="rId15"/>
-                <a:stretch>
-                  <a:fillRect t="-4444" b="-15556"/>
-                </a:stretch>
-              </a:blipFill>
-            </p:spPr>
-            <p:txBody>
-              <a:bodyPr/>
-              <a:lstStyle/>
-              <a:p>
-                <a:r>
-                  <a:rPr lang="zh-CN" altLang="en-US">
-                    <a:noFill/>
-                  </a:rPr>
-                  <a:t> </a:t>
-                </a:r>
-              </a:p>
-            </p:txBody>
-          </p:sp>
-        </mc:Fallback>
-      </mc:AlternateContent>
-      <mc:AlternateContent xmlns:mc="http://schemas.openxmlformats.org/markup-compatibility/2006">
-        <mc:Choice xmlns:a14="http://schemas.microsoft.com/office/drawing/2010/main" Requires="a14">
-          <p:sp>
-            <p:nvSpPr>
-              <p:cNvPr id="32" name="文本框 31">
-                <a:extLst>
-                  <a:ext uri="{FF2B5EF4-FFF2-40B4-BE49-F238E27FC236}">
-                    <a16:creationId xmlns:a16="http://schemas.microsoft.com/office/drawing/2014/main" id="{D038F870-8EA0-4815-8D27-098D223DCF67}"/>
-                  </a:ext>
-                </a:extLst>
-              </p:cNvPr>
-              <p:cNvSpPr txBox="1"/>
-              <p:nvPr/>
-            </p:nvSpPr>
-            <p:spPr>
-              <a:xfrm>
-                <a:off x="5256316" y="2644575"/>
-                <a:ext cx="2160000" cy="276999"/>
-              </a:xfrm>
-              <a:prstGeom prst="rect">
-                <a:avLst/>
-              </a:prstGeom>
-              <a:noFill/>
-            </p:spPr>
-            <p:txBody>
-              <a:bodyPr wrap="square" rtlCol="0">
-                <a:spAutoFit/>
-              </a:bodyPr>
-              <a:lstStyle/>
-              <a:p>
-                <a:r>
-                  <a:rPr lang="zh-CN" altLang="en-US" sz="1200" dirty="0"/>
-                  <a:t>图像</a:t>
-                </a:r>
-                <a14:m>
-                  <m:oMath xmlns:m="http://schemas.openxmlformats.org/officeDocument/2006/math">
-                    <m:r>
-                      <a:rPr lang="en-US" altLang="zh-CN" sz="1200" i="1" dirty="0" smtClean="0">
-                        <a:latin typeface="Cambria Math" panose="02040503050406030204" pitchFamily="18" charset="0"/>
-                      </a:rPr>
-                      <m:t>𝑚</m:t>
-                    </m:r>
-                  </m:oMath>
-                </a14:m>
-                <a:endParaRPr lang="zh-CN" altLang="en-US" sz="1200" dirty="0"/>
-              </a:p>
-            </p:txBody>
-          </p:sp>
-        </mc:Choice>
-        <mc:Fallback>
-          <p:sp>
-            <p:nvSpPr>
-              <p:cNvPr id="32" name="文本框 31">
-                <a:extLst>
-                  <a:ext uri="{FF2B5EF4-FFF2-40B4-BE49-F238E27FC236}">
-                    <a16:creationId xmlns:a16="http://schemas.microsoft.com/office/drawing/2014/main" id="{D038F870-8EA0-4815-8D27-098D223DCF67}"/>
-                  </a:ext>
-                </a:extLst>
-              </p:cNvPr>
-              <p:cNvSpPr txBox="1">
-                <a:spLocks noRot="1" noChangeAspect="1" noMove="1" noResize="1" noEditPoints="1" noAdjustHandles="1" noChangeArrowheads="1" noChangeShapeType="1" noTextEdit="1"/>
-              </p:cNvSpPr>
-              <p:nvPr/>
-            </p:nvSpPr>
-            <p:spPr>
-              <a:xfrm>
-                <a:off x="5256316" y="2644575"/>
-                <a:ext cx="2160000" cy="276999"/>
-              </a:xfrm>
-              <a:prstGeom prst="rect">
-                <a:avLst/>
-              </a:prstGeom>
-              <a:blipFill>
-                <a:blip r:embed="rId16"/>
-                <a:stretch>
-                  <a:fillRect t="-4444" b="-15556"/>
-                </a:stretch>
-              </a:blipFill>
-            </p:spPr>
-            <p:txBody>
-              <a:bodyPr/>
-              <a:lstStyle/>
-              <a:p>
-                <a:r>
-                  <a:rPr lang="zh-CN" altLang="en-US">
-                    <a:noFill/>
-                  </a:rPr>
-                  <a:t> </a:t>
-                </a:r>
-              </a:p>
-            </p:txBody>
-          </p:sp>
-        </mc:Fallback>
-      </mc:AlternateContent>
+        </p:grpSpPr>
+        <p:pic>
+          <p:nvPicPr>
+            <p:cNvPr id="11" name="图片 10">
+              <a:extLst>
+                <a:ext uri="{FF2B5EF4-FFF2-40B4-BE49-F238E27FC236}">
+                  <a16:creationId xmlns:a16="http://schemas.microsoft.com/office/drawing/2014/main" id="{A03B70A3-8498-4C11-91C2-0FAA10A73F11}"/>
+                </a:ext>
+              </a:extLst>
+            </p:cNvPr>
+            <p:cNvPicPr>
+              <a:picLocks noChangeAspect="1"/>
+            </p:cNvPicPr>
+            <p:nvPr/>
+          </p:nvPicPr>
+          <p:blipFill>
+            <a:blip r:embed="rId3">
+              <a:extLst>
+                <a:ext uri="{28A0092B-C50C-407E-A947-70E740481C1C}">
+                  <a14:useLocalDpi xmlns:a14="http://schemas.microsoft.com/office/drawing/2010/main" val="0"/>
+                </a:ext>
+              </a:extLst>
+            </a:blip>
+            <a:stretch>
+              <a:fillRect/>
+            </a:stretch>
+          </p:blipFill>
+          <p:spPr>
+            <a:xfrm>
+              <a:off x="4103948" y="2284512"/>
+              <a:ext cx="1080000" cy="1080000"/>
+            </a:xfrm>
+            <a:prstGeom prst="rect">
+              <a:avLst/>
+            </a:prstGeom>
+          </p:spPr>
+        </p:pic>
+        <p:pic>
+          <p:nvPicPr>
+            <p:cNvPr id="13" name="图片 12">
+              <a:extLst>
+                <a:ext uri="{FF2B5EF4-FFF2-40B4-BE49-F238E27FC236}">
+                  <a16:creationId xmlns:a16="http://schemas.microsoft.com/office/drawing/2014/main" id="{66CA3E9D-E9B4-419C-A428-23B01F947604}"/>
+                </a:ext>
+              </a:extLst>
+            </p:cNvPr>
+            <p:cNvPicPr>
+              <a:picLocks noChangeAspect="1"/>
+            </p:cNvPicPr>
+            <p:nvPr/>
+          </p:nvPicPr>
+          <p:blipFill>
+            <a:blip r:embed="rId4">
+              <a:extLst>
+                <a:ext uri="{28A0092B-C50C-407E-A947-70E740481C1C}">
+                  <a14:useLocalDpi xmlns:a14="http://schemas.microsoft.com/office/drawing/2010/main" val="0"/>
+                </a:ext>
+              </a:extLst>
+            </a:blip>
+            <a:stretch>
+              <a:fillRect/>
+            </a:stretch>
+          </p:blipFill>
+          <p:spPr>
+            <a:xfrm>
+              <a:off x="1943948" y="1204512"/>
+              <a:ext cx="1080000" cy="1080000"/>
+            </a:xfrm>
+            <a:prstGeom prst="rect">
+              <a:avLst/>
+            </a:prstGeom>
+          </p:spPr>
+        </p:pic>
+        <p:pic>
+          <p:nvPicPr>
+            <p:cNvPr id="15" name="图片 14">
+              <a:extLst>
+                <a:ext uri="{FF2B5EF4-FFF2-40B4-BE49-F238E27FC236}">
+                  <a16:creationId xmlns:a16="http://schemas.microsoft.com/office/drawing/2014/main" id="{91C4CC97-BC7E-4FBB-877A-C8D1DD084041}"/>
+                </a:ext>
+              </a:extLst>
+            </p:cNvPr>
+            <p:cNvPicPr>
+              <a:picLocks noChangeAspect="1"/>
+            </p:cNvPicPr>
+            <p:nvPr/>
+          </p:nvPicPr>
+          <p:blipFill>
+            <a:blip r:embed="rId5">
+              <a:extLst>
+                <a:ext uri="{28A0092B-C50C-407E-A947-70E740481C1C}">
+                  <a14:useLocalDpi xmlns:a14="http://schemas.microsoft.com/office/drawing/2010/main" val="0"/>
+                </a:ext>
+              </a:extLst>
+            </a:blip>
+            <a:stretch>
+              <a:fillRect/>
+            </a:stretch>
+          </p:blipFill>
+          <p:spPr>
+            <a:xfrm>
+              <a:off x="3023948" y="1204512"/>
+              <a:ext cx="1080000" cy="1080000"/>
+            </a:xfrm>
+            <a:prstGeom prst="rect">
+              <a:avLst/>
+            </a:prstGeom>
+          </p:spPr>
+        </p:pic>
+        <p:pic>
+          <p:nvPicPr>
+            <p:cNvPr id="17" name="图片 16">
+              <a:extLst>
+                <a:ext uri="{FF2B5EF4-FFF2-40B4-BE49-F238E27FC236}">
+                  <a16:creationId xmlns:a16="http://schemas.microsoft.com/office/drawing/2014/main" id="{ED1E064E-1759-4FCB-A50A-727B8EA94947}"/>
+                </a:ext>
+              </a:extLst>
+            </p:cNvPr>
+            <p:cNvPicPr>
+              <a:picLocks noChangeAspect="1"/>
+            </p:cNvPicPr>
+            <p:nvPr/>
+          </p:nvPicPr>
+          <p:blipFill>
+            <a:blip r:embed="rId6">
+              <a:extLst>
+                <a:ext uri="{28A0092B-C50C-407E-A947-70E740481C1C}">
+                  <a14:useLocalDpi xmlns:a14="http://schemas.microsoft.com/office/drawing/2010/main" val="0"/>
+                </a:ext>
+              </a:extLst>
+            </a:blip>
+            <a:stretch>
+              <a:fillRect/>
+            </a:stretch>
+          </p:blipFill>
+          <p:spPr>
+            <a:xfrm>
+              <a:off x="5183948" y="1207556"/>
+              <a:ext cx="1080000" cy="1080000"/>
+            </a:xfrm>
+            <a:prstGeom prst="rect">
+              <a:avLst/>
+            </a:prstGeom>
+          </p:spPr>
+        </p:pic>
+        <p:pic>
+          <p:nvPicPr>
+            <p:cNvPr id="19" name="图片 18">
+              <a:extLst>
+                <a:ext uri="{FF2B5EF4-FFF2-40B4-BE49-F238E27FC236}">
+                  <a16:creationId xmlns:a16="http://schemas.microsoft.com/office/drawing/2014/main" id="{570F38E1-6438-48AE-8927-5F77A5DFC9BE}"/>
+                </a:ext>
+              </a:extLst>
+            </p:cNvPr>
+            <p:cNvPicPr>
+              <a:picLocks noChangeAspect="1"/>
+            </p:cNvPicPr>
+            <p:nvPr/>
+          </p:nvPicPr>
+          <p:blipFill>
+            <a:blip r:embed="rId7">
+              <a:extLst>
+                <a:ext uri="{28A0092B-C50C-407E-A947-70E740481C1C}">
+                  <a14:useLocalDpi xmlns:a14="http://schemas.microsoft.com/office/drawing/2010/main" val="0"/>
+                </a:ext>
+              </a:extLst>
+            </a:blip>
+            <a:stretch>
+              <a:fillRect/>
+            </a:stretch>
+          </p:blipFill>
+          <p:spPr>
+            <a:xfrm>
+              <a:off x="6263948" y="1207556"/>
+              <a:ext cx="1080000" cy="1080000"/>
+            </a:xfrm>
+            <a:prstGeom prst="rect">
+              <a:avLst/>
+            </a:prstGeom>
+          </p:spPr>
+        </p:pic>
+        <p:pic>
+          <p:nvPicPr>
+            <p:cNvPr id="21" name="图片 20">
+              <a:extLst>
+                <a:ext uri="{FF2B5EF4-FFF2-40B4-BE49-F238E27FC236}">
+                  <a16:creationId xmlns:a16="http://schemas.microsoft.com/office/drawing/2014/main" id="{538BD140-A657-45F0-A41E-A2FD0950C0AA}"/>
+                </a:ext>
+              </a:extLst>
+            </p:cNvPr>
+            <p:cNvPicPr>
+              <a:picLocks noChangeAspect="1"/>
+            </p:cNvPicPr>
+            <p:nvPr/>
+          </p:nvPicPr>
+          <p:blipFill>
+            <a:blip r:embed="rId8">
+              <a:extLst>
+                <a:ext uri="{28A0092B-C50C-407E-A947-70E740481C1C}">
+                  <a14:useLocalDpi xmlns:a14="http://schemas.microsoft.com/office/drawing/2010/main" val="0"/>
+                </a:ext>
+              </a:extLst>
+            </a:blip>
+            <a:stretch>
+              <a:fillRect/>
+            </a:stretch>
+          </p:blipFill>
+          <p:spPr>
+            <a:xfrm>
+              <a:off x="1943948" y="3369495"/>
+              <a:ext cx="1080000" cy="1080000"/>
+            </a:xfrm>
+            <a:prstGeom prst="rect">
+              <a:avLst/>
+            </a:prstGeom>
+          </p:spPr>
+        </p:pic>
+        <p:pic>
+          <p:nvPicPr>
+            <p:cNvPr id="23" name="图片 22">
+              <a:extLst>
+                <a:ext uri="{FF2B5EF4-FFF2-40B4-BE49-F238E27FC236}">
+                  <a16:creationId xmlns:a16="http://schemas.microsoft.com/office/drawing/2014/main" id="{41446B84-8610-4976-B8CC-C8292E1DC67F}"/>
+                </a:ext>
+              </a:extLst>
+            </p:cNvPr>
+            <p:cNvPicPr>
+              <a:picLocks noChangeAspect="1"/>
+            </p:cNvPicPr>
+            <p:nvPr/>
+          </p:nvPicPr>
+          <p:blipFill>
+            <a:blip r:embed="rId9">
+              <a:extLst>
+                <a:ext uri="{28A0092B-C50C-407E-A947-70E740481C1C}">
+                  <a14:useLocalDpi xmlns:a14="http://schemas.microsoft.com/office/drawing/2010/main" val="0"/>
+                </a:ext>
+              </a:extLst>
+            </a:blip>
+            <a:stretch>
+              <a:fillRect/>
+            </a:stretch>
+          </p:blipFill>
+          <p:spPr>
+            <a:xfrm>
+              <a:off x="3023948" y="3369495"/>
+              <a:ext cx="1080000" cy="1080000"/>
+            </a:xfrm>
+            <a:prstGeom prst="rect">
+              <a:avLst/>
+            </a:prstGeom>
+          </p:spPr>
+        </p:pic>
+        <p:pic>
+          <p:nvPicPr>
+            <p:cNvPr id="25" name="图片 24">
+              <a:extLst>
+                <a:ext uri="{FF2B5EF4-FFF2-40B4-BE49-F238E27FC236}">
+                  <a16:creationId xmlns:a16="http://schemas.microsoft.com/office/drawing/2014/main" id="{237F6B25-FED9-4B1D-A421-E4FB63DC9993}"/>
+                </a:ext>
+              </a:extLst>
+            </p:cNvPr>
+            <p:cNvPicPr>
+              <a:picLocks noChangeAspect="1"/>
+            </p:cNvPicPr>
+            <p:nvPr/>
+          </p:nvPicPr>
+          <p:blipFill>
+            <a:blip r:embed="rId10">
+              <a:extLst>
+                <a:ext uri="{28A0092B-C50C-407E-A947-70E740481C1C}">
+                  <a14:useLocalDpi xmlns:a14="http://schemas.microsoft.com/office/drawing/2010/main" val="0"/>
+                </a:ext>
+              </a:extLst>
+            </a:blip>
+            <a:stretch>
+              <a:fillRect/>
+            </a:stretch>
+          </p:blipFill>
+          <p:spPr>
+            <a:xfrm>
+              <a:off x="5183948" y="3369495"/>
+              <a:ext cx="1080000" cy="1080000"/>
+            </a:xfrm>
+            <a:prstGeom prst="rect">
+              <a:avLst/>
+            </a:prstGeom>
+          </p:spPr>
+        </p:pic>
+        <p:pic>
+          <p:nvPicPr>
+            <p:cNvPr id="27" name="图片 26">
+              <a:extLst>
+                <a:ext uri="{FF2B5EF4-FFF2-40B4-BE49-F238E27FC236}">
+                  <a16:creationId xmlns:a16="http://schemas.microsoft.com/office/drawing/2014/main" id="{E9A36241-9567-498D-90A6-33725CCA4C84}"/>
+                </a:ext>
+              </a:extLst>
+            </p:cNvPr>
+            <p:cNvPicPr>
+              <a:picLocks noChangeAspect="1"/>
+            </p:cNvPicPr>
+            <p:nvPr/>
+          </p:nvPicPr>
+          <p:blipFill>
+            <a:blip r:embed="rId11">
+              <a:extLst>
+                <a:ext uri="{28A0092B-C50C-407E-A947-70E740481C1C}">
+                  <a14:useLocalDpi xmlns:a14="http://schemas.microsoft.com/office/drawing/2010/main" val="0"/>
+                </a:ext>
+              </a:extLst>
+            </a:blip>
+            <a:stretch>
+              <a:fillRect/>
+            </a:stretch>
+          </p:blipFill>
+          <p:spPr>
+            <a:xfrm>
+              <a:off x="6263948" y="3369495"/>
+              <a:ext cx="1080000" cy="1080000"/>
+            </a:xfrm>
+            <a:prstGeom prst="rect">
+              <a:avLst/>
+            </a:prstGeom>
+          </p:spPr>
+        </p:pic>
+        <mc:AlternateContent xmlns:mc="http://schemas.openxmlformats.org/markup-compatibility/2006">
+          <mc:Choice xmlns:a14="http://schemas.microsoft.com/office/drawing/2010/main" Requires="a14">
+            <p:sp>
+              <p:nvSpPr>
+                <p:cNvPr id="28" name="文本框 27">
+                  <a:extLst>
+                    <a:ext uri="{FF2B5EF4-FFF2-40B4-BE49-F238E27FC236}">
+                      <a16:creationId xmlns:a16="http://schemas.microsoft.com/office/drawing/2014/main" id="{434717EE-09FC-4361-A287-1CFB82F28DA0}"/>
+                    </a:ext>
+                  </a:extLst>
+                </p:cNvPr>
+                <p:cNvSpPr txBox="1"/>
+                <p:nvPr/>
+              </p:nvSpPr>
+              <p:spPr>
+                <a:xfrm>
+                  <a:off x="1943948" y="880379"/>
+                  <a:ext cx="2160000" cy="276999"/>
+                </a:xfrm>
+                <a:prstGeom prst="rect">
+                  <a:avLst/>
+                </a:prstGeom>
+                <a:noFill/>
+              </p:spPr>
+              <p:txBody>
+                <a:bodyPr wrap="square" rtlCol="0">
+                  <a:spAutoFit/>
+                </a:bodyPr>
+                <a:lstStyle/>
+                <a:p>
+                  <a:r>
+                    <a:rPr lang="zh-CN" altLang="en-US" sz="1200" dirty="0"/>
+                    <a:t>线圈灵敏度</a:t>
+                  </a:r>
+                  <a14:m>
+                    <m:oMath xmlns:m="http://schemas.openxmlformats.org/officeDocument/2006/math">
+                      <m:sSub>
+                        <m:sSubPr>
+                          <m:ctrlPr>
+                            <a:rPr lang="en-US" altLang="zh-CN" sz="1200" b="0" i="1" dirty="0" smtClean="0">
+                              <a:latin typeface="Cambria Math" panose="02040503050406030204" pitchFamily="18" charset="0"/>
+                            </a:rPr>
+                          </m:ctrlPr>
+                        </m:sSubPr>
+                        <m:e>
+                          <m:r>
+                            <a:rPr lang="en-US" altLang="zh-CN" sz="1200" i="1" dirty="0" smtClean="0">
+                              <a:latin typeface="Cambria Math" panose="02040503050406030204" pitchFamily="18" charset="0"/>
+                            </a:rPr>
+                            <m:t>𝑆</m:t>
+                          </m:r>
+                        </m:e>
+                        <m:sub>
+                          <m:r>
+                            <a:rPr lang="en-US" altLang="zh-CN" sz="1200" b="0" i="1" dirty="0" smtClean="0">
+                              <a:latin typeface="Cambria Math" panose="02040503050406030204" pitchFamily="18" charset="0"/>
+                            </a:rPr>
+                            <m:t>1</m:t>
+                          </m:r>
+                        </m:sub>
+                      </m:sSub>
+                      <m:r>
+                        <a:rPr lang="en-US" altLang="zh-CN" sz="1200" b="0" i="1" dirty="0" smtClean="0">
+                          <a:latin typeface="Cambria Math" panose="02040503050406030204" pitchFamily="18" charset="0"/>
+                        </a:rPr>
+                        <m:t>      </m:t>
+                      </m:r>
+                    </m:oMath>
+                  </a14:m>
+                  <a:r>
+                    <a:rPr lang="zh-CN" altLang="en-US" sz="1200" dirty="0"/>
+                    <a:t>线圈图像</a:t>
+                  </a:r>
+                  <a14:m>
+                    <m:oMath xmlns:m="http://schemas.openxmlformats.org/officeDocument/2006/math">
+                      <m:sSub>
+                        <m:sSubPr>
+                          <m:ctrlPr>
+                            <a:rPr lang="en-US" altLang="zh-CN" sz="1200" i="1" dirty="0" smtClean="0">
+                              <a:latin typeface="Cambria Math" panose="02040503050406030204" pitchFamily="18" charset="0"/>
+                            </a:rPr>
+                          </m:ctrlPr>
+                        </m:sSubPr>
+                        <m:e>
+                          <m:r>
+                            <a:rPr lang="en-US" altLang="zh-CN" sz="1200" i="1" dirty="0" smtClean="0">
+                              <a:latin typeface="Cambria Math" panose="02040503050406030204" pitchFamily="18" charset="0"/>
+                            </a:rPr>
+                            <m:t>𝑚</m:t>
+                          </m:r>
+                        </m:e>
+                        <m:sub>
+                          <m:r>
+                            <a:rPr lang="en-US" altLang="zh-CN" sz="1200" b="0" i="1" dirty="0" smtClean="0">
+                              <a:latin typeface="Cambria Math" panose="02040503050406030204" pitchFamily="18" charset="0"/>
+                            </a:rPr>
+                            <m:t>1</m:t>
+                          </m:r>
+                        </m:sub>
+                      </m:sSub>
+                    </m:oMath>
+                  </a14:m>
+                  <a:endParaRPr lang="zh-CN" altLang="en-US" sz="1200" dirty="0"/>
+                </a:p>
+              </p:txBody>
+            </p:sp>
+          </mc:Choice>
+          <mc:Fallback>
+            <p:sp>
+              <p:nvSpPr>
+                <p:cNvPr id="28" name="文本框 27">
+                  <a:extLst>
+                    <a:ext uri="{FF2B5EF4-FFF2-40B4-BE49-F238E27FC236}">
+                      <a16:creationId xmlns:a16="http://schemas.microsoft.com/office/drawing/2014/main" id="{434717EE-09FC-4361-A287-1CFB82F28DA0}"/>
+                    </a:ext>
+                  </a:extLst>
+                </p:cNvPr>
+                <p:cNvSpPr txBox="1">
+                  <a:spLocks noRot="1" noChangeAspect="1" noMove="1" noResize="1" noEditPoints="1" noAdjustHandles="1" noChangeArrowheads="1" noChangeShapeType="1" noTextEdit="1"/>
+                </p:cNvSpPr>
+                <p:nvPr/>
+              </p:nvSpPr>
+              <p:spPr>
+                <a:xfrm>
+                  <a:off x="1943948" y="880379"/>
+                  <a:ext cx="2160000" cy="276999"/>
+                </a:xfrm>
+                <a:prstGeom prst="rect">
+                  <a:avLst/>
+                </a:prstGeom>
+                <a:blipFill>
+                  <a:blip r:embed="rId12"/>
+                  <a:stretch>
+                    <a:fillRect l="-282" t="-2174" b="-13043"/>
+                  </a:stretch>
+                </a:blipFill>
+              </p:spPr>
+              <p:txBody>
+                <a:bodyPr/>
+                <a:lstStyle/>
+                <a:p>
+                  <a:r>
+                    <a:rPr lang="zh-CN" altLang="en-US">
+                      <a:noFill/>
+                    </a:rPr>
+                    <a:t> </a:t>
+                  </a:r>
+                </a:p>
+              </p:txBody>
+            </p:sp>
+          </mc:Fallback>
+        </mc:AlternateContent>
+        <mc:AlternateContent xmlns:mc="http://schemas.openxmlformats.org/markup-compatibility/2006">
+          <mc:Choice xmlns:a14="http://schemas.microsoft.com/office/drawing/2010/main" Requires="a14">
+            <p:sp>
+              <p:nvSpPr>
+                <p:cNvPr id="29" name="文本框 28">
+                  <a:extLst>
+                    <a:ext uri="{FF2B5EF4-FFF2-40B4-BE49-F238E27FC236}">
+                      <a16:creationId xmlns:a16="http://schemas.microsoft.com/office/drawing/2014/main" id="{338AABAB-90B5-4353-B70B-60E98778D259}"/>
+                    </a:ext>
+                  </a:extLst>
+                </p:cNvPr>
+                <p:cNvSpPr txBox="1"/>
+                <p:nvPr/>
+              </p:nvSpPr>
+              <p:spPr>
+                <a:xfrm>
+                  <a:off x="2015956" y="4516783"/>
+                  <a:ext cx="2160000" cy="276999"/>
+                </a:xfrm>
+                <a:prstGeom prst="rect">
+                  <a:avLst/>
+                </a:prstGeom>
+                <a:noFill/>
+              </p:spPr>
+              <p:txBody>
+                <a:bodyPr wrap="square" rtlCol="0">
+                  <a:spAutoFit/>
+                </a:bodyPr>
+                <a:lstStyle/>
+                <a:p>
+                  <a:r>
+                    <a:rPr lang="zh-CN" altLang="en-US" sz="1200" dirty="0"/>
+                    <a:t>线圈灵敏度</a:t>
+                  </a:r>
+                  <a14:m>
+                    <m:oMath xmlns:m="http://schemas.openxmlformats.org/officeDocument/2006/math">
+                      <m:sSub>
+                        <m:sSubPr>
+                          <m:ctrlPr>
+                            <a:rPr lang="en-US" altLang="zh-CN" sz="1200" b="0" i="1" dirty="0" smtClean="0">
+                              <a:latin typeface="Cambria Math" panose="02040503050406030204" pitchFamily="18" charset="0"/>
+                            </a:rPr>
+                          </m:ctrlPr>
+                        </m:sSubPr>
+                        <m:e>
+                          <m:r>
+                            <a:rPr lang="en-US" altLang="zh-CN" sz="1200" i="1" dirty="0" smtClean="0">
+                              <a:latin typeface="Cambria Math" panose="02040503050406030204" pitchFamily="18" charset="0"/>
+                            </a:rPr>
+                            <m:t>𝑆</m:t>
+                          </m:r>
+                        </m:e>
+                        <m:sub>
+                          <m:r>
+                            <a:rPr lang="en-US" altLang="zh-CN" sz="1200" b="0" i="1" dirty="0" smtClean="0">
+                              <a:latin typeface="Cambria Math" panose="02040503050406030204" pitchFamily="18" charset="0"/>
+                            </a:rPr>
+                            <m:t>3</m:t>
+                          </m:r>
+                        </m:sub>
+                      </m:sSub>
+                      <m:r>
+                        <a:rPr lang="en-US" altLang="zh-CN" sz="1200" b="0" i="1" dirty="0" smtClean="0">
+                          <a:latin typeface="Cambria Math" panose="02040503050406030204" pitchFamily="18" charset="0"/>
+                        </a:rPr>
+                        <m:t>      </m:t>
+                      </m:r>
+                    </m:oMath>
+                  </a14:m>
+                  <a:r>
+                    <a:rPr lang="zh-CN" altLang="en-US" sz="1200" dirty="0"/>
+                    <a:t>线圈图像</a:t>
+                  </a:r>
+                  <a14:m>
+                    <m:oMath xmlns:m="http://schemas.openxmlformats.org/officeDocument/2006/math">
+                      <m:sSub>
+                        <m:sSubPr>
+                          <m:ctrlPr>
+                            <a:rPr lang="en-US" altLang="zh-CN" sz="1200" i="1" dirty="0" smtClean="0">
+                              <a:latin typeface="Cambria Math" panose="02040503050406030204" pitchFamily="18" charset="0"/>
+                            </a:rPr>
+                          </m:ctrlPr>
+                        </m:sSubPr>
+                        <m:e>
+                          <m:r>
+                            <a:rPr lang="en-US" altLang="zh-CN" sz="1200" i="1" dirty="0" smtClean="0">
+                              <a:latin typeface="Cambria Math" panose="02040503050406030204" pitchFamily="18" charset="0"/>
+                            </a:rPr>
+                            <m:t>𝑚</m:t>
+                          </m:r>
+                        </m:e>
+                        <m:sub>
+                          <m:r>
+                            <a:rPr lang="en-US" altLang="zh-CN" sz="1200" b="0" i="1" dirty="0" smtClean="0">
+                              <a:latin typeface="Cambria Math" panose="02040503050406030204" pitchFamily="18" charset="0"/>
+                            </a:rPr>
+                            <m:t>3</m:t>
+                          </m:r>
+                        </m:sub>
+                      </m:sSub>
+                    </m:oMath>
+                  </a14:m>
+                  <a:endParaRPr lang="zh-CN" altLang="en-US" sz="1200" dirty="0"/>
+                </a:p>
+              </p:txBody>
+            </p:sp>
+          </mc:Choice>
+          <mc:Fallback>
+            <p:sp>
+              <p:nvSpPr>
+                <p:cNvPr id="29" name="文本框 28">
+                  <a:extLst>
+                    <a:ext uri="{FF2B5EF4-FFF2-40B4-BE49-F238E27FC236}">
+                      <a16:creationId xmlns:a16="http://schemas.microsoft.com/office/drawing/2014/main" id="{338AABAB-90B5-4353-B70B-60E98778D259}"/>
+                    </a:ext>
+                  </a:extLst>
+                </p:cNvPr>
+                <p:cNvSpPr txBox="1">
+                  <a:spLocks noRot="1" noChangeAspect="1" noMove="1" noResize="1" noEditPoints="1" noAdjustHandles="1" noChangeArrowheads="1" noChangeShapeType="1" noTextEdit="1"/>
+                </p:cNvSpPr>
+                <p:nvPr/>
+              </p:nvSpPr>
+              <p:spPr>
+                <a:xfrm>
+                  <a:off x="2015956" y="4516783"/>
+                  <a:ext cx="2160000" cy="276999"/>
+                </a:xfrm>
+                <a:prstGeom prst="rect">
+                  <a:avLst/>
+                </a:prstGeom>
+                <a:blipFill>
+                  <a:blip r:embed="rId13"/>
+                  <a:stretch>
+                    <a:fillRect l="-282" t="-4444" b="-15556"/>
+                  </a:stretch>
+                </a:blipFill>
+              </p:spPr>
+              <p:txBody>
+                <a:bodyPr/>
+                <a:lstStyle/>
+                <a:p>
+                  <a:r>
+                    <a:rPr lang="zh-CN" altLang="en-US">
+                      <a:noFill/>
+                    </a:rPr>
+                    <a:t> </a:t>
+                  </a:r>
+                </a:p>
+              </p:txBody>
+            </p:sp>
+          </mc:Fallback>
+        </mc:AlternateContent>
+        <mc:AlternateContent xmlns:mc="http://schemas.openxmlformats.org/markup-compatibility/2006">
+          <mc:Choice xmlns:a14="http://schemas.microsoft.com/office/drawing/2010/main" Requires="a14">
+            <p:sp>
+              <p:nvSpPr>
+                <p:cNvPr id="30" name="文本框 29">
+                  <a:extLst>
+                    <a:ext uri="{FF2B5EF4-FFF2-40B4-BE49-F238E27FC236}">
+                      <a16:creationId xmlns:a16="http://schemas.microsoft.com/office/drawing/2014/main" id="{0467A768-98E8-4A67-A2FE-915B5EED4158}"/>
+                    </a:ext>
+                  </a:extLst>
+                </p:cNvPr>
+                <p:cNvSpPr txBox="1"/>
+                <p:nvPr/>
+              </p:nvSpPr>
+              <p:spPr>
+                <a:xfrm>
+                  <a:off x="5256316" y="879219"/>
+                  <a:ext cx="2160000" cy="276999"/>
+                </a:xfrm>
+                <a:prstGeom prst="rect">
+                  <a:avLst/>
+                </a:prstGeom>
+                <a:noFill/>
+              </p:spPr>
+              <p:txBody>
+                <a:bodyPr wrap="square" rtlCol="0">
+                  <a:spAutoFit/>
+                </a:bodyPr>
+                <a:lstStyle/>
+                <a:p>
+                  <a:r>
+                    <a:rPr lang="zh-CN" altLang="en-US" sz="1200" dirty="0"/>
+                    <a:t>线圈灵敏度</a:t>
+                  </a:r>
+                  <a14:m>
+                    <m:oMath xmlns:m="http://schemas.openxmlformats.org/officeDocument/2006/math">
+                      <m:sSub>
+                        <m:sSubPr>
+                          <m:ctrlPr>
+                            <a:rPr lang="en-US" altLang="zh-CN" sz="1200" b="0" i="1" dirty="0" smtClean="0">
+                              <a:latin typeface="Cambria Math" panose="02040503050406030204" pitchFamily="18" charset="0"/>
+                            </a:rPr>
+                          </m:ctrlPr>
+                        </m:sSubPr>
+                        <m:e>
+                          <m:r>
+                            <a:rPr lang="en-US" altLang="zh-CN" sz="1200" i="1" dirty="0" smtClean="0">
+                              <a:latin typeface="Cambria Math" panose="02040503050406030204" pitchFamily="18" charset="0"/>
+                            </a:rPr>
+                            <m:t>𝑆</m:t>
+                          </m:r>
+                        </m:e>
+                        <m:sub>
+                          <m:r>
+                            <a:rPr lang="en-US" altLang="zh-CN" sz="1200" b="0" i="1" dirty="0" smtClean="0">
+                              <a:latin typeface="Cambria Math" panose="02040503050406030204" pitchFamily="18" charset="0"/>
+                            </a:rPr>
+                            <m:t>2</m:t>
+                          </m:r>
+                        </m:sub>
+                      </m:sSub>
+                      <m:r>
+                        <a:rPr lang="en-US" altLang="zh-CN" sz="1200" b="0" i="1" dirty="0" smtClean="0">
+                          <a:latin typeface="Cambria Math" panose="02040503050406030204" pitchFamily="18" charset="0"/>
+                        </a:rPr>
+                        <m:t>      </m:t>
+                      </m:r>
+                    </m:oMath>
+                  </a14:m>
+                  <a:r>
+                    <a:rPr lang="zh-CN" altLang="en-US" sz="1200" dirty="0"/>
+                    <a:t>线圈图像</a:t>
+                  </a:r>
+                  <a14:m>
+                    <m:oMath xmlns:m="http://schemas.openxmlformats.org/officeDocument/2006/math">
+                      <m:sSub>
+                        <m:sSubPr>
+                          <m:ctrlPr>
+                            <a:rPr lang="en-US" altLang="zh-CN" sz="1200" i="1" dirty="0" smtClean="0">
+                              <a:latin typeface="Cambria Math" panose="02040503050406030204" pitchFamily="18" charset="0"/>
+                            </a:rPr>
+                          </m:ctrlPr>
+                        </m:sSubPr>
+                        <m:e>
+                          <m:r>
+                            <a:rPr lang="en-US" altLang="zh-CN" sz="1200" i="1" dirty="0" smtClean="0">
+                              <a:latin typeface="Cambria Math" panose="02040503050406030204" pitchFamily="18" charset="0"/>
+                            </a:rPr>
+                            <m:t>𝑚</m:t>
+                          </m:r>
+                        </m:e>
+                        <m:sub>
+                          <m:r>
+                            <a:rPr lang="en-US" altLang="zh-CN" sz="1200" b="0" i="1" dirty="0" smtClean="0">
+                              <a:latin typeface="Cambria Math" panose="02040503050406030204" pitchFamily="18" charset="0"/>
+                            </a:rPr>
+                            <m:t>2</m:t>
+                          </m:r>
+                        </m:sub>
+                      </m:sSub>
+                    </m:oMath>
+                  </a14:m>
+                  <a:endParaRPr lang="zh-CN" altLang="en-US" sz="1200" dirty="0"/>
+                </a:p>
+              </p:txBody>
+            </p:sp>
+          </mc:Choice>
+          <mc:Fallback>
+            <p:sp>
+              <p:nvSpPr>
+                <p:cNvPr id="30" name="文本框 29">
+                  <a:extLst>
+                    <a:ext uri="{FF2B5EF4-FFF2-40B4-BE49-F238E27FC236}">
+                      <a16:creationId xmlns:a16="http://schemas.microsoft.com/office/drawing/2014/main" id="{0467A768-98E8-4A67-A2FE-915B5EED4158}"/>
+                    </a:ext>
+                  </a:extLst>
+                </p:cNvPr>
+                <p:cNvSpPr txBox="1">
+                  <a:spLocks noRot="1" noChangeAspect="1" noMove="1" noResize="1" noEditPoints="1" noAdjustHandles="1" noChangeArrowheads="1" noChangeShapeType="1" noTextEdit="1"/>
+                </p:cNvSpPr>
+                <p:nvPr/>
+              </p:nvSpPr>
+              <p:spPr>
+                <a:xfrm>
+                  <a:off x="5256316" y="879219"/>
+                  <a:ext cx="2160000" cy="276999"/>
+                </a:xfrm>
+                <a:prstGeom prst="rect">
+                  <a:avLst/>
+                </a:prstGeom>
+                <a:blipFill>
+                  <a:blip r:embed="rId14"/>
+                  <a:stretch>
+                    <a:fillRect t="-2174" b="-13043"/>
+                  </a:stretch>
+                </a:blipFill>
+              </p:spPr>
+              <p:txBody>
+                <a:bodyPr/>
+                <a:lstStyle/>
+                <a:p>
+                  <a:r>
+                    <a:rPr lang="zh-CN" altLang="en-US">
+                      <a:noFill/>
+                    </a:rPr>
+                    <a:t> </a:t>
+                  </a:r>
+                </a:p>
+              </p:txBody>
+            </p:sp>
+          </mc:Fallback>
+        </mc:AlternateContent>
+        <mc:AlternateContent xmlns:mc="http://schemas.openxmlformats.org/markup-compatibility/2006">
+          <mc:Choice xmlns:a14="http://schemas.microsoft.com/office/drawing/2010/main" Requires="a14">
+            <p:sp>
+              <p:nvSpPr>
+                <p:cNvPr id="31" name="文本框 30">
+                  <a:extLst>
+                    <a:ext uri="{FF2B5EF4-FFF2-40B4-BE49-F238E27FC236}">
+                      <a16:creationId xmlns:a16="http://schemas.microsoft.com/office/drawing/2014/main" id="{21C84E98-8F00-413B-A4D1-4EE548E54189}"/>
+                    </a:ext>
+                  </a:extLst>
+                </p:cNvPr>
+                <p:cNvSpPr txBox="1"/>
+                <p:nvPr/>
+              </p:nvSpPr>
+              <p:spPr>
+                <a:xfrm>
+                  <a:off x="5256316" y="4515623"/>
+                  <a:ext cx="2160000" cy="276999"/>
+                </a:xfrm>
+                <a:prstGeom prst="rect">
+                  <a:avLst/>
+                </a:prstGeom>
+                <a:noFill/>
+              </p:spPr>
+              <p:txBody>
+                <a:bodyPr wrap="square" rtlCol="0">
+                  <a:spAutoFit/>
+                </a:bodyPr>
+                <a:lstStyle/>
+                <a:p>
+                  <a:r>
+                    <a:rPr lang="zh-CN" altLang="en-US" sz="1200" dirty="0"/>
+                    <a:t>线圈灵敏度</a:t>
+                  </a:r>
+                  <a14:m>
+                    <m:oMath xmlns:m="http://schemas.openxmlformats.org/officeDocument/2006/math">
+                      <m:sSub>
+                        <m:sSubPr>
+                          <m:ctrlPr>
+                            <a:rPr lang="en-US" altLang="zh-CN" sz="1200" b="0" i="1" dirty="0" smtClean="0">
+                              <a:latin typeface="Cambria Math" panose="02040503050406030204" pitchFamily="18" charset="0"/>
+                            </a:rPr>
+                          </m:ctrlPr>
+                        </m:sSubPr>
+                        <m:e>
+                          <m:r>
+                            <a:rPr lang="en-US" altLang="zh-CN" sz="1200" i="1" dirty="0" smtClean="0">
+                              <a:latin typeface="Cambria Math" panose="02040503050406030204" pitchFamily="18" charset="0"/>
+                            </a:rPr>
+                            <m:t>𝑆</m:t>
+                          </m:r>
+                        </m:e>
+                        <m:sub>
+                          <m:r>
+                            <a:rPr lang="en-US" altLang="zh-CN" sz="1200" b="0" i="1" dirty="0" smtClean="0">
+                              <a:latin typeface="Cambria Math" panose="02040503050406030204" pitchFamily="18" charset="0"/>
+                            </a:rPr>
+                            <m:t>4</m:t>
+                          </m:r>
+                        </m:sub>
+                      </m:sSub>
+                      <m:r>
+                        <a:rPr lang="en-US" altLang="zh-CN" sz="1200" b="0" i="1" dirty="0" smtClean="0">
+                          <a:latin typeface="Cambria Math" panose="02040503050406030204" pitchFamily="18" charset="0"/>
+                        </a:rPr>
+                        <m:t>      </m:t>
+                      </m:r>
+                    </m:oMath>
+                  </a14:m>
+                  <a:r>
+                    <a:rPr lang="zh-CN" altLang="en-US" sz="1200" dirty="0"/>
+                    <a:t>线圈图像</a:t>
+                  </a:r>
+                  <a14:m>
+                    <m:oMath xmlns:m="http://schemas.openxmlformats.org/officeDocument/2006/math">
+                      <m:sSub>
+                        <m:sSubPr>
+                          <m:ctrlPr>
+                            <a:rPr lang="en-US" altLang="zh-CN" sz="1200" i="1" dirty="0" smtClean="0">
+                              <a:latin typeface="Cambria Math" panose="02040503050406030204" pitchFamily="18" charset="0"/>
+                            </a:rPr>
+                          </m:ctrlPr>
+                        </m:sSubPr>
+                        <m:e>
+                          <m:r>
+                            <a:rPr lang="en-US" altLang="zh-CN" sz="1200" i="1" dirty="0" smtClean="0">
+                              <a:latin typeface="Cambria Math" panose="02040503050406030204" pitchFamily="18" charset="0"/>
+                            </a:rPr>
+                            <m:t>𝑚</m:t>
+                          </m:r>
+                        </m:e>
+                        <m:sub>
+                          <m:r>
+                            <a:rPr lang="en-US" altLang="zh-CN" sz="1200" b="0" i="1" dirty="0" smtClean="0">
+                              <a:latin typeface="Cambria Math" panose="02040503050406030204" pitchFamily="18" charset="0"/>
+                            </a:rPr>
+                            <m:t>4</m:t>
+                          </m:r>
+                        </m:sub>
+                      </m:sSub>
+                    </m:oMath>
+                  </a14:m>
+                  <a:endParaRPr lang="zh-CN" altLang="en-US" sz="1200" dirty="0"/>
+                </a:p>
+              </p:txBody>
+            </p:sp>
+          </mc:Choice>
+          <mc:Fallback>
+            <p:sp>
+              <p:nvSpPr>
+                <p:cNvPr id="31" name="文本框 30">
+                  <a:extLst>
+                    <a:ext uri="{FF2B5EF4-FFF2-40B4-BE49-F238E27FC236}">
+                      <a16:creationId xmlns:a16="http://schemas.microsoft.com/office/drawing/2014/main" id="{21C84E98-8F00-413B-A4D1-4EE548E54189}"/>
+                    </a:ext>
+                  </a:extLst>
+                </p:cNvPr>
+                <p:cNvSpPr txBox="1">
+                  <a:spLocks noRot="1" noChangeAspect="1" noMove="1" noResize="1" noEditPoints="1" noAdjustHandles="1" noChangeArrowheads="1" noChangeShapeType="1" noTextEdit="1"/>
+                </p:cNvSpPr>
+                <p:nvPr/>
+              </p:nvSpPr>
+              <p:spPr>
+                <a:xfrm>
+                  <a:off x="5256316" y="4515623"/>
+                  <a:ext cx="2160000" cy="276999"/>
+                </a:xfrm>
+                <a:prstGeom prst="rect">
+                  <a:avLst/>
+                </a:prstGeom>
+                <a:blipFill>
+                  <a:blip r:embed="rId15"/>
+                  <a:stretch>
+                    <a:fillRect t="-4444" b="-15556"/>
+                  </a:stretch>
+                </a:blipFill>
+              </p:spPr>
+              <p:txBody>
+                <a:bodyPr/>
+                <a:lstStyle/>
+                <a:p>
+                  <a:r>
+                    <a:rPr lang="zh-CN" altLang="en-US">
+                      <a:noFill/>
+                    </a:rPr>
+                    <a:t> </a:t>
+                  </a:r>
+                </a:p>
+              </p:txBody>
+            </p:sp>
+          </mc:Fallback>
+        </mc:AlternateContent>
+        <mc:AlternateContent xmlns:mc="http://schemas.openxmlformats.org/markup-compatibility/2006">
+          <mc:Choice xmlns:a14="http://schemas.microsoft.com/office/drawing/2010/main" Requires="a14">
+            <p:sp>
+              <p:nvSpPr>
+                <p:cNvPr id="32" name="文本框 31">
+                  <a:extLst>
+                    <a:ext uri="{FF2B5EF4-FFF2-40B4-BE49-F238E27FC236}">
+                      <a16:creationId xmlns:a16="http://schemas.microsoft.com/office/drawing/2014/main" id="{D038F870-8EA0-4815-8D27-098D223DCF67}"/>
+                    </a:ext>
+                  </a:extLst>
+                </p:cNvPr>
+                <p:cNvSpPr txBox="1"/>
+                <p:nvPr/>
+              </p:nvSpPr>
+              <p:spPr>
+                <a:xfrm>
+                  <a:off x="5256316" y="2644575"/>
+                  <a:ext cx="2160000" cy="276999"/>
+                </a:xfrm>
+                <a:prstGeom prst="rect">
+                  <a:avLst/>
+                </a:prstGeom>
+                <a:noFill/>
+              </p:spPr>
+              <p:txBody>
+                <a:bodyPr wrap="square" rtlCol="0">
+                  <a:spAutoFit/>
+                </a:bodyPr>
+                <a:lstStyle/>
+                <a:p>
+                  <a:r>
+                    <a:rPr lang="zh-CN" altLang="en-US" sz="1200" dirty="0"/>
+                    <a:t>图像</a:t>
+                  </a:r>
+                  <a14:m>
+                    <m:oMath xmlns:m="http://schemas.openxmlformats.org/officeDocument/2006/math">
+                      <m:r>
+                        <a:rPr lang="en-US" altLang="zh-CN" sz="1200" i="1" dirty="0" smtClean="0">
+                          <a:latin typeface="Cambria Math" panose="02040503050406030204" pitchFamily="18" charset="0"/>
+                        </a:rPr>
+                        <m:t>𝑚</m:t>
+                      </m:r>
+                    </m:oMath>
+                  </a14:m>
+                  <a:endParaRPr lang="zh-CN" altLang="en-US" sz="1200" dirty="0"/>
+                </a:p>
+              </p:txBody>
+            </p:sp>
+          </mc:Choice>
+          <mc:Fallback>
+            <p:sp>
+              <p:nvSpPr>
+                <p:cNvPr id="32" name="文本框 31">
+                  <a:extLst>
+                    <a:ext uri="{FF2B5EF4-FFF2-40B4-BE49-F238E27FC236}">
+                      <a16:creationId xmlns:a16="http://schemas.microsoft.com/office/drawing/2014/main" id="{D038F870-8EA0-4815-8D27-098D223DCF67}"/>
+                    </a:ext>
+                  </a:extLst>
+                </p:cNvPr>
+                <p:cNvSpPr txBox="1">
+                  <a:spLocks noRot="1" noChangeAspect="1" noMove="1" noResize="1" noEditPoints="1" noAdjustHandles="1" noChangeArrowheads="1" noChangeShapeType="1" noTextEdit="1"/>
+                </p:cNvSpPr>
+                <p:nvPr/>
+              </p:nvSpPr>
+              <p:spPr>
+                <a:xfrm>
+                  <a:off x="5256316" y="2644575"/>
+                  <a:ext cx="2160000" cy="276999"/>
+                </a:xfrm>
+                <a:prstGeom prst="rect">
+                  <a:avLst/>
+                </a:prstGeom>
+                <a:blipFill>
+                  <a:blip r:embed="rId16"/>
+                  <a:stretch>
+                    <a:fillRect t="-4444" b="-15556"/>
+                  </a:stretch>
+                </a:blipFill>
+              </p:spPr>
+              <p:txBody>
+                <a:bodyPr/>
+                <a:lstStyle/>
+                <a:p>
+                  <a:r>
+                    <a:rPr lang="zh-CN" altLang="en-US">
+                      <a:noFill/>
+                    </a:rPr>
+                    <a:t> </a:t>
+                  </a:r>
+                </a:p>
+              </p:txBody>
+            </p:sp>
+          </mc:Fallback>
+        </mc:AlternateContent>
+      </p:grpSp>
       <p:sp>
         <p:nvSpPr>
           <p:cNvPr id="33" name="矩形 32">
@@ -24737,7 +24961,7 @@
         </p:nvSpPr>
         <p:spPr>
           <a:xfrm>
-            <a:off x="287524" y="232284"/>
+            <a:off x="287524" y="197545"/>
             <a:ext cx="2977358" cy="438582"/>
           </a:xfrm>
           <a:prstGeom prst="rect">
@@ -24900,8 +25124,8 @@
           </a:p>
         </p:txBody>
       </p:sp>
-      <mc:AlternateContent xmlns:mc="http://schemas.openxmlformats.org/markup-compatibility/2006">
-        <mc:Choice xmlns:a14="http://schemas.microsoft.com/office/drawing/2010/main" Requires="a14">
+      <mc:AlternateContent xmlns:mc="http://schemas.openxmlformats.org/markup-compatibility/2006" xmlns:a14="http://schemas.microsoft.com/office/drawing/2010/main">
+        <mc:Choice Requires="a14">
           <p:sp>
             <p:nvSpPr>
               <p:cNvPr id="3" name="文本框 2">
@@ -25127,7 +25351,9 @@
                       <m:t>𝑦</m:t>
                     </m:r>
                     <m:r>
-                      <a:rPr lang="en-US" altLang="zh-CN" i="1"/>
+                      <a:rPr lang="en-US" altLang="zh-CN" i="1">
+                        <a:latin typeface="Cambria Math" panose="02040503050406030204" pitchFamily="18" charset="0"/>
+                      </a:rPr>
                       <m:t>≔</m:t>
                     </m:r>
                     <m:d>
@@ -25135,7 +25361,9 @@
                         <m:begChr m:val="["/>
                         <m:endChr m:val="]"/>
                         <m:ctrlPr>
-                          <a:rPr lang="zh-CN" altLang="zh-CN" i="1"/>
+                          <a:rPr lang="zh-CN" altLang="zh-CN" i="1">
+                            <a:latin typeface="Cambria Math" panose="02040503050406030204" pitchFamily="18" charset="0"/>
+                          </a:rPr>
                         </m:ctrlPr>
                       </m:dPr>
                       <m:e>
@@ -25150,7 +25378,9 @@
                               </m:mc>
                             </m:mcs>
                             <m:ctrlPr>
-                              <a:rPr lang="zh-CN" altLang="zh-CN" i="1"/>
+                              <a:rPr lang="zh-CN" altLang="zh-CN" i="1">
+                                <a:latin typeface="Cambria Math" panose="02040503050406030204" pitchFamily="18" charset="0"/>
+                              </a:rPr>
                             </m:ctrlPr>
                           </m:mPr>
                           <m:mr>
@@ -25158,7 +25388,9 @@
                               <m:sSub>
                                 <m:sSubPr>
                                   <m:ctrlPr>
-                                    <a:rPr lang="zh-CN" altLang="zh-CN" i="1"/>
+                                    <a:rPr lang="zh-CN" altLang="zh-CN" i="1">
+                                      <a:latin typeface="Cambria Math" panose="02040503050406030204" pitchFamily="18" charset="0"/>
+                                    </a:rPr>
                                   </m:ctrlPr>
                                 </m:sSubPr>
                                 <m:e>
@@ -25171,7 +25403,9 @@
                                 </m:e>
                                 <m:sub>
                                   <m:r>
-                                    <a:rPr lang="en-US" altLang="zh-CN" i="1"/>
+                                    <a:rPr lang="en-US" altLang="zh-CN" i="1">
+                                      <a:latin typeface="Cambria Math" panose="02040503050406030204" pitchFamily="18" charset="0"/>
+                                    </a:rPr>
                                     <m:t>1</m:t>
                                   </m:r>
                                 </m:sub>
@@ -25181,7 +25415,9 @@
                           <m:mr>
                             <m:e>
                               <m:r>
-                                <a:rPr lang="en-US" altLang="zh-CN" i="1"/>
+                                <a:rPr lang="en-US" altLang="zh-CN" i="1">
+                                  <a:latin typeface="Cambria Math" panose="02040503050406030204" pitchFamily="18" charset="0"/>
+                                </a:rPr>
                                 <m:t>⋮</m:t>
                               </m:r>
                             </m:e>
@@ -25191,7 +25427,9 @@
                               <m:sSub>
                                 <m:sSubPr>
                                   <m:ctrlPr>
-                                    <a:rPr lang="zh-CN" altLang="zh-CN" i="1"/>
+                                    <a:rPr lang="zh-CN" altLang="zh-CN" i="1">
+                                      <a:latin typeface="Cambria Math" panose="02040503050406030204" pitchFamily="18" charset="0"/>
+                                    </a:rPr>
                                   </m:ctrlPr>
                                 </m:sSubPr>
                                 <m:e>
@@ -25217,30 +25455,40 @@
                       </m:e>
                     </m:d>
                     <m:r>
-                      <a:rPr lang="en-US" altLang="zh-CN" i="1"/>
+                      <a:rPr lang="en-US" altLang="zh-CN" i="1">
+                        <a:latin typeface="Cambria Math" panose="02040503050406030204" pitchFamily="18" charset="0"/>
+                      </a:rPr>
                       <m:t>, </m:t>
                     </m:r>
                     <m:sSub>
                       <m:sSubPr>
                         <m:ctrlPr>
-                          <a:rPr lang="zh-CN" altLang="zh-CN" i="1"/>
+                          <a:rPr lang="zh-CN" altLang="zh-CN" i="1">
+                            <a:latin typeface="Cambria Math" panose="02040503050406030204" pitchFamily="18" charset="0"/>
+                          </a:rPr>
                         </m:ctrlPr>
                       </m:sSubPr>
                       <m:e>
                         <m:r>
-                          <a:rPr lang="en-US" altLang="zh-CN" i="1"/>
+                          <a:rPr lang="en-US" altLang="zh-CN" i="1">
+                            <a:latin typeface="Cambria Math" panose="02040503050406030204" pitchFamily="18" charset="0"/>
+                          </a:rPr>
                           <m:t>𝐹</m:t>
                         </m:r>
                       </m:e>
                       <m:sub>
                         <m:r>
-                          <a:rPr lang="en-US" altLang="zh-CN" i="1"/>
+                          <a:rPr lang="en-US" altLang="zh-CN" i="1">
+                            <a:latin typeface="Cambria Math" panose="02040503050406030204" pitchFamily="18" charset="0"/>
+                          </a:rPr>
                           <m:t>𝑝</m:t>
                         </m:r>
                       </m:sub>
                     </m:sSub>
                     <m:r>
-                      <a:rPr lang="en-US" altLang="zh-CN" i="1"/>
+                      <a:rPr lang="en-US" altLang="zh-CN" i="1">
+                        <a:latin typeface="Cambria Math" panose="02040503050406030204" pitchFamily="18" charset="0"/>
+                      </a:rPr>
                       <m:t>≔</m:t>
                     </m:r>
                     <m:d>
@@ -25248,7 +25496,9 @@
                         <m:begChr m:val="["/>
                         <m:endChr m:val="]"/>
                         <m:ctrlPr>
-                          <a:rPr lang="zh-CN" altLang="zh-CN" i="1"/>
+                          <a:rPr lang="zh-CN" altLang="zh-CN" i="1">
+                            <a:latin typeface="Cambria Math" panose="02040503050406030204" pitchFamily="18" charset="0"/>
+                          </a:rPr>
                         </m:ctrlPr>
                       </m:dPr>
                       <m:e>
@@ -25263,13 +25513,17 @@
                               </m:mc>
                             </m:mcs>
                             <m:ctrlPr>
-                              <a:rPr lang="zh-CN" altLang="zh-CN" i="1"/>
+                              <a:rPr lang="zh-CN" altLang="zh-CN" i="1">
+                                <a:latin typeface="Cambria Math" panose="02040503050406030204" pitchFamily="18" charset="0"/>
+                              </a:rPr>
                             </m:ctrlPr>
                           </m:mPr>
                           <m:mr>
                             <m:e>
                               <m:r>
-                                <a:rPr lang="en-US" altLang="zh-CN" i="1"/>
+                                <a:rPr lang="en-US" altLang="zh-CN" i="1">
+                                  <a:latin typeface="Cambria Math" panose="02040503050406030204" pitchFamily="18" charset="0"/>
+                                </a:rPr>
                                 <m:t>𝐹</m:t>
                               </m:r>
                             </m:e>
@@ -25280,7 +25534,9 @@
                             <m:e/>
                             <m:e>
                               <m:r>
-                                <a:rPr lang="en-US" altLang="zh-CN" i="1"/>
+                                <a:rPr lang="en-US" altLang="zh-CN" i="1">
+                                  <a:latin typeface="Cambria Math" panose="02040503050406030204" pitchFamily="18" charset="0"/>
+                                </a:rPr>
                                 <m:t>⋱</m:t>
                               </m:r>
                             </m:e>
@@ -25291,7 +25547,9 @@
                             <m:e/>
                             <m:e>
                               <m:r>
-                                <a:rPr lang="en-US" altLang="zh-CN" i="1"/>
+                                <a:rPr lang="en-US" altLang="zh-CN" i="1">
+                                  <a:latin typeface="Cambria Math" panose="02040503050406030204" pitchFamily="18" charset="0"/>
+                                </a:rPr>
                                 <m:t>𝐹</m:t>
                               </m:r>
                             </m:e>
@@ -25300,7 +25558,9 @@
                       </m:e>
                     </m:d>
                     <m:r>
-                      <a:rPr lang="en-US" altLang="zh-CN" i="1" smtClean="0"/>
+                      <a:rPr lang="en-US" altLang="zh-CN" i="1" smtClean="0">
+                        <a:latin typeface="Cambria Math" panose="02040503050406030204" pitchFamily="18" charset="0"/>
+                      </a:rPr>
                       <m:t>,</m:t>
                     </m:r>
                     <m:r>
@@ -25320,7 +25580,9 @@
                         <m:begChr m:val="["/>
                         <m:endChr m:val="]"/>
                         <m:ctrlPr>
-                          <a:rPr lang="zh-CN" altLang="zh-CN" i="1"/>
+                          <a:rPr lang="zh-CN" altLang="zh-CN" i="1">
+                            <a:latin typeface="Cambria Math" panose="02040503050406030204" pitchFamily="18" charset="0"/>
+                          </a:rPr>
                         </m:ctrlPr>
                       </m:dPr>
                       <m:e>
@@ -25335,7 +25597,9 @@
                               </m:mc>
                             </m:mcs>
                             <m:ctrlPr>
-                              <a:rPr lang="zh-CN" altLang="zh-CN" i="1"/>
+                              <a:rPr lang="zh-CN" altLang="zh-CN" i="1">
+                                <a:latin typeface="Cambria Math" panose="02040503050406030204" pitchFamily="18" charset="0"/>
+                              </a:rPr>
                             </m:ctrlPr>
                           </m:mPr>
                           <m:mr>
@@ -25343,18 +25607,24 @@
                               <m:sSub>
                                 <m:sSubPr>
                                   <m:ctrlPr>
-                                    <a:rPr lang="zh-CN" altLang="zh-CN" i="1"/>
+                                    <a:rPr lang="zh-CN" altLang="zh-CN" i="1">
+                                      <a:latin typeface="Cambria Math" panose="02040503050406030204" pitchFamily="18" charset="0"/>
+                                    </a:rPr>
                                   </m:ctrlPr>
                                 </m:sSubPr>
                                 <m:e>
                                   <m:r>
-                                    <a:rPr lang="en-US" altLang="zh-CN" i="1"/>
+                                    <a:rPr lang="en-US" altLang="zh-CN" i="1">
+                                      <a:latin typeface="Cambria Math" panose="02040503050406030204" pitchFamily="18" charset="0"/>
+                                    </a:rPr>
                                     <m:t>𝑆</m:t>
                                   </m:r>
                                 </m:e>
                                 <m:sub>
                                   <m:r>
-                                    <a:rPr lang="en-US" altLang="zh-CN" i="1"/>
+                                    <a:rPr lang="en-US" altLang="zh-CN" i="1">
+                                      <a:latin typeface="Cambria Math" panose="02040503050406030204" pitchFamily="18" charset="0"/>
+                                    </a:rPr>
                                     <m:t>1</m:t>
                                   </m:r>
                                 </m:sub>
@@ -25364,7 +25634,9 @@
                           <m:mr>
                             <m:e>
                               <m:r>
-                                <a:rPr lang="en-US" altLang="zh-CN" i="1"/>
+                                <a:rPr lang="en-US" altLang="zh-CN" i="1">
+                                  <a:latin typeface="Cambria Math" panose="02040503050406030204" pitchFamily="18" charset="0"/>
+                                </a:rPr>
                                 <m:t>⋮</m:t>
                               </m:r>
                             </m:e>
@@ -25374,12 +25646,16 @@
                               <m:sSub>
                                 <m:sSubPr>
                                   <m:ctrlPr>
-                                    <a:rPr lang="zh-CN" altLang="zh-CN" i="1"/>
+                                    <a:rPr lang="zh-CN" altLang="zh-CN" i="1">
+                                      <a:latin typeface="Cambria Math" panose="02040503050406030204" pitchFamily="18" charset="0"/>
+                                    </a:rPr>
                                   </m:ctrlPr>
                                 </m:sSubPr>
                                 <m:e>
                                   <m:r>
-                                    <a:rPr lang="en-US" altLang="zh-CN" i="1"/>
+                                    <a:rPr lang="en-US" altLang="zh-CN" i="1">
+                                      <a:latin typeface="Cambria Math" panose="02040503050406030204" pitchFamily="18" charset="0"/>
+                                    </a:rPr>
                                     <m:t>𝑆</m:t>
                                   </m:r>
                                 </m:e>
@@ -25398,30 +25674,40 @@
                       </m:e>
                     </m:d>
                     <m:r>
-                      <a:rPr lang="en-US" altLang="zh-CN" i="1" smtClean="0"/>
+                      <a:rPr lang="en-US" altLang="zh-CN" i="1" smtClean="0">
+                        <a:latin typeface="Cambria Math" panose="02040503050406030204" pitchFamily="18" charset="0"/>
+                      </a:rPr>
                       <m:t>,</m:t>
                     </m:r>
                     <m:sSub>
                       <m:sSubPr>
                         <m:ctrlPr>
-                          <a:rPr lang="zh-CN" altLang="zh-CN" i="1" smtClean="0"/>
+                          <a:rPr lang="zh-CN" altLang="zh-CN" i="1" smtClean="0">
+                            <a:latin typeface="Cambria Math" panose="02040503050406030204" pitchFamily="18" charset="0"/>
+                          </a:rPr>
                         </m:ctrlPr>
                       </m:sSubPr>
                       <m:e>
                         <m:r>
-                          <a:rPr lang="en-US" altLang="zh-CN" i="1"/>
+                          <a:rPr lang="en-US" altLang="zh-CN" i="1">
+                            <a:latin typeface="Cambria Math" panose="02040503050406030204" pitchFamily="18" charset="0"/>
+                          </a:rPr>
                           <m:t>𝑄</m:t>
                         </m:r>
                       </m:e>
                       <m:sub>
                         <m:r>
-                          <a:rPr lang="en-US" altLang="zh-CN" i="1"/>
+                          <a:rPr lang="en-US" altLang="zh-CN" i="1">
+                            <a:latin typeface="Cambria Math" panose="02040503050406030204" pitchFamily="18" charset="0"/>
+                          </a:rPr>
                           <m:t>𝑃</m:t>
                         </m:r>
                       </m:sub>
                     </m:sSub>
                     <m:r>
-                      <a:rPr lang="en-US" altLang="zh-CN" i="1"/>
+                      <a:rPr lang="en-US" altLang="zh-CN" i="1">
+                        <a:latin typeface="Cambria Math" panose="02040503050406030204" pitchFamily="18" charset="0"/>
+                      </a:rPr>
                       <m:t>≔</m:t>
                     </m:r>
                     <m:d>
@@ -25429,7 +25715,9 @@
                         <m:begChr m:val="["/>
                         <m:endChr m:val="]"/>
                         <m:ctrlPr>
-                          <a:rPr lang="zh-CN" altLang="zh-CN" i="1"/>
+                          <a:rPr lang="zh-CN" altLang="zh-CN" i="1">
+                            <a:latin typeface="Cambria Math" panose="02040503050406030204" pitchFamily="18" charset="0"/>
+                          </a:rPr>
                         </m:ctrlPr>
                       </m:dPr>
                       <m:e>
@@ -25444,13 +25732,17 @@
                               </m:mc>
                             </m:mcs>
                             <m:ctrlPr>
-                              <a:rPr lang="zh-CN" altLang="zh-CN" i="1"/>
+                              <a:rPr lang="zh-CN" altLang="zh-CN" i="1">
+                                <a:latin typeface="Cambria Math" panose="02040503050406030204" pitchFamily="18" charset="0"/>
+                              </a:rPr>
                             </m:ctrlPr>
                           </m:mPr>
                           <m:mr>
                             <m:e>
                               <m:r>
-                                <a:rPr lang="en-US" altLang="zh-CN" i="1"/>
+                                <a:rPr lang="en-US" altLang="zh-CN" i="1">
+                                  <a:latin typeface="Cambria Math" panose="02040503050406030204" pitchFamily="18" charset="0"/>
+                                </a:rPr>
                                 <m:t>𝑃</m:t>
                               </m:r>
                             </m:e>
@@ -25461,7 +25753,9 @@
                             <m:e/>
                             <m:e>
                               <m:r>
-                                <a:rPr lang="en-US" altLang="zh-CN" i="1"/>
+                                <a:rPr lang="en-US" altLang="zh-CN" i="1">
+                                  <a:latin typeface="Cambria Math" panose="02040503050406030204" pitchFamily="18" charset="0"/>
+                                </a:rPr>
                                 <m:t>⋱</m:t>
                               </m:r>
                             </m:e>
@@ -25472,7 +25766,9 @@
                             <m:e/>
                             <m:e>
                               <m:r>
-                                <a:rPr lang="en-US" altLang="zh-CN" i="1"/>
+                                <a:rPr lang="en-US" altLang="zh-CN" i="1">
+                                  <a:latin typeface="Cambria Math" panose="02040503050406030204" pitchFamily="18" charset="0"/>
+                                </a:rPr>
                                 <m:t>𝑃</m:t>
                               </m:r>
                             </m:e>
@@ -25481,15 +25777,21 @@
                       </m:e>
                     </m:d>
                     <m:r>
-                      <a:rPr lang="en-US" altLang="zh-CN" i="1"/>
+                      <a:rPr lang="en-US" altLang="zh-CN" i="1">
+                        <a:latin typeface="Cambria Math" panose="02040503050406030204" pitchFamily="18" charset="0"/>
+                      </a:rPr>
                       <m:t>,</m:t>
                     </m:r>
                     <m:r>
-                      <a:rPr lang="en-US" altLang="zh-CN" i="1"/>
+                      <a:rPr lang="en-US" altLang="zh-CN" i="1">
+                        <a:latin typeface="Cambria Math" panose="02040503050406030204" pitchFamily="18" charset="0"/>
+                      </a:rPr>
                       <m:t>𝜂</m:t>
                     </m:r>
                     <m:r>
-                      <a:rPr lang="en-US" altLang="zh-CN" i="1"/>
+                      <a:rPr lang="en-US" altLang="zh-CN" i="1">
+                        <a:latin typeface="Cambria Math" panose="02040503050406030204" pitchFamily="18" charset="0"/>
+                      </a:rPr>
                       <m:t>≔</m:t>
                     </m:r>
                     <m:d>
@@ -25497,7 +25799,9 @@
                         <m:begChr m:val="["/>
                         <m:endChr m:val="]"/>
                         <m:ctrlPr>
-                          <a:rPr lang="zh-CN" altLang="zh-CN" i="1"/>
+                          <a:rPr lang="zh-CN" altLang="zh-CN" i="1">
+                            <a:latin typeface="Cambria Math" panose="02040503050406030204" pitchFamily="18" charset="0"/>
+                          </a:rPr>
                         </m:ctrlPr>
                       </m:dPr>
                       <m:e>
@@ -25512,7 +25816,9 @@
                               </m:mc>
                             </m:mcs>
                             <m:ctrlPr>
-                              <a:rPr lang="zh-CN" altLang="zh-CN" i="1"/>
+                              <a:rPr lang="zh-CN" altLang="zh-CN" i="1">
+                                <a:latin typeface="Cambria Math" panose="02040503050406030204" pitchFamily="18" charset="0"/>
+                              </a:rPr>
                             </m:ctrlPr>
                           </m:mPr>
                           <m:mr>
@@ -25520,18 +25826,24 @@
                               <m:sSub>
                                 <m:sSubPr>
                                   <m:ctrlPr>
-                                    <a:rPr lang="zh-CN" altLang="zh-CN" i="1"/>
+                                    <a:rPr lang="zh-CN" altLang="zh-CN" i="1">
+                                      <a:latin typeface="Cambria Math" panose="02040503050406030204" pitchFamily="18" charset="0"/>
+                                    </a:rPr>
                                   </m:ctrlPr>
                                 </m:sSubPr>
                                 <m:e>
                                   <m:r>
-                                    <a:rPr lang="en-US" altLang="zh-CN" i="1"/>
+                                    <a:rPr lang="en-US" altLang="zh-CN" i="1">
+                                      <a:latin typeface="Cambria Math" panose="02040503050406030204" pitchFamily="18" charset="0"/>
+                                    </a:rPr>
                                     <m:t>𝜂</m:t>
                                   </m:r>
                                 </m:e>
                                 <m:sub>
                                   <m:r>
-                                    <a:rPr lang="en-US" altLang="zh-CN" i="1"/>
+                                    <a:rPr lang="en-US" altLang="zh-CN" i="1">
+                                      <a:latin typeface="Cambria Math" panose="02040503050406030204" pitchFamily="18" charset="0"/>
+                                    </a:rPr>
                                     <m:t>1</m:t>
                                   </m:r>
                                 </m:sub>
@@ -25541,7 +25853,9 @@
                           <m:mr>
                             <m:e>
                               <m:r>
-                                <a:rPr lang="en-US" altLang="zh-CN" i="1"/>
+                                <a:rPr lang="en-US" altLang="zh-CN" i="1">
+                                  <a:latin typeface="Cambria Math" panose="02040503050406030204" pitchFamily="18" charset="0"/>
+                                </a:rPr>
                                 <m:t>⋮</m:t>
                               </m:r>
                             </m:e>
@@ -25551,12 +25865,16 @@
                               <m:sSub>
                                 <m:sSubPr>
                                   <m:ctrlPr>
-                                    <a:rPr lang="zh-CN" altLang="zh-CN" i="1"/>
+                                    <a:rPr lang="zh-CN" altLang="zh-CN" i="1">
+                                      <a:latin typeface="Cambria Math" panose="02040503050406030204" pitchFamily="18" charset="0"/>
+                                    </a:rPr>
                                   </m:ctrlPr>
                                 </m:sSubPr>
                                 <m:e>
                                   <m:r>
-                                    <a:rPr lang="en-US" altLang="zh-CN" i="1"/>
+                                    <a:rPr lang="en-US" altLang="zh-CN" i="1">
+                                      <a:latin typeface="Cambria Math" panose="02040503050406030204" pitchFamily="18" charset="0"/>
+                                    </a:rPr>
                                     <m:t>𝜂</m:t>
                                   </m:r>
                                 </m:e>
@@ -25575,7 +25893,9 @@
                       </m:e>
                     </m:d>
                     <m:r>
-                      <a:rPr lang="en-US" altLang="zh-CN" i="1"/>
+                      <a:rPr lang="en-US" altLang="zh-CN" i="1">
+                        <a:latin typeface="Cambria Math" panose="02040503050406030204" pitchFamily="18" charset="0"/>
+                      </a:rPr>
                       <m:t>.</m:t>
                     </m:r>
                   </m:oMath>
@@ -25919,7 +26239,7 @@
             </p:txBody>
           </p:sp>
         </mc:Choice>
-        <mc:Fallback>
+        <mc:Fallback xmlns="">
           <p:sp>
             <p:nvSpPr>
               <p:cNvPr id="3" name="文本框 2">

</xml_diff>